<commit_message>
Add breadcum, fix deal process, slide
</commit_message>
<xml_diff>
--- a/Temp/HuyBD/FTS Presentation/FTS.pptx
+++ b/Temp/HuyBD/FTS Presentation/FTS.pptx
@@ -13,11 +13,11 @@
     <p:sldId id="282" r:id="rId4"/>
     <p:sldId id="283" r:id="rId5"/>
     <p:sldId id="284" r:id="rId6"/>
-    <p:sldId id="266" r:id="rId7"/>
-    <p:sldId id="268" r:id="rId8"/>
+    <p:sldId id="285" r:id="rId7"/>
+    <p:sldId id="286" r:id="rId8"/>
     <p:sldId id="270" r:id="rId9"/>
-    <p:sldId id="271" r:id="rId10"/>
-    <p:sldId id="272" r:id="rId11"/>
+    <p:sldId id="272" r:id="rId10"/>
+    <p:sldId id="287" r:id="rId11"/>
     <p:sldId id="257" r:id="rId12"/>
     <p:sldId id="274" r:id="rId13"/>
     <p:sldId id="275" r:id="rId14"/>
@@ -1944,7 +1944,11 @@
     </dgm:pt>
     <dgm:pt modelId="{35ACBCBC-1BA4-4430-A6E9-DC25346C6354}" type="pres">
       <dgm:prSet presAssocID="{EC963368-6907-48B7-9F19-8D0DF825B60B}" presName="imgShp" presStyleLbl="fgImgPlace1" presStyleIdx="0" presStyleCnt="4"/>
-      <dgm:spPr/>
+      <dgm:spPr>
+        <a:solidFill>
+          <a:schemeClr val="accent2"/>
+        </a:solidFill>
+      </dgm:spPr>
     </dgm:pt>
     <dgm:pt modelId="{DA722338-9A0A-4FA7-A0E1-F1247EC6A1EF}" type="pres">
       <dgm:prSet presAssocID="{EC963368-6907-48B7-9F19-8D0DF825B60B}" presName="txShp" presStyleLbl="node1" presStyleIdx="0" presStyleCnt="4">
@@ -2045,14 +2049,14 @@
   </dgm:ptLst>
   <dgm:cxnLst>
     <dgm:cxn modelId="{EF87E1BE-1CE5-4219-BD20-B94D6C086D6A}" type="presOf" srcId="{826954DA-BEDD-4964-B666-0054DADBD264}" destId="{B5915A0D-7259-489E-A4F4-38CDB64A6625}" srcOrd="0" destOrd="0" presId="urn:microsoft.com/office/officeart/2005/8/layout/vList3"/>
+    <dgm:cxn modelId="{2B3D2357-8665-44B3-8B68-1892DC8E40B7}" type="presOf" srcId="{B0DFDF3A-EAB6-44DD-82EC-52490D11795F}" destId="{ABFC4959-323D-43E6-A058-575E4AF10E6D}" srcOrd="0" destOrd="0" presId="urn:microsoft.com/office/officeart/2005/8/layout/vList3"/>
+    <dgm:cxn modelId="{C4256E35-A53B-49D9-9867-A30856AD44C4}" srcId="{8CE6A6C0-0CE9-4C67-A5CA-7DD13E66DC61}" destId="{826954DA-BEDD-4964-B666-0054DADBD264}" srcOrd="1" destOrd="0" parTransId="{305CF992-CFC5-4747-B199-8AE6C2EBEE20}" sibTransId="{151AC144-32A1-4EF7-89F2-AF13775F4448}"/>
     <dgm:cxn modelId="{5402BA36-1A65-4F11-AB64-EE463892B932}" srcId="{8CE6A6C0-0CE9-4C67-A5CA-7DD13E66DC61}" destId="{EC963368-6907-48B7-9F19-8D0DF825B60B}" srcOrd="0" destOrd="0" parTransId="{E6937441-4BA0-4F33-B4E9-252B2680AB18}" sibTransId="{E0A1DF25-2188-4FA4-AF3A-84693B4F1F9E}"/>
+    <dgm:cxn modelId="{EA594014-91F1-4CDD-8E58-E70BEBCAC5F2}" type="presOf" srcId="{EC963368-6907-48B7-9F19-8D0DF825B60B}" destId="{DA722338-9A0A-4FA7-A0E1-F1247EC6A1EF}" srcOrd="0" destOrd="0" presId="urn:microsoft.com/office/officeart/2005/8/layout/vList3"/>
+    <dgm:cxn modelId="{ACD756B8-E58A-4072-91FB-2ED742297732}" type="presOf" srcId="{8CE6A6C0-0CE9-4C67-A5CA-7DD13E66DC61}" destId="{D9300EB8-65FB-476B-8CA3-47BB3BD0B524}" srcOrd="0" destOrd="0" presId="urn:microsoft.com/office/officeart/2005/8/layout/vList3"/>
+    <dgm:cxn modelId="{E1EC4440-37D9-4421-8BFC-84B0EB16CCC4}" srcId="{8CE6A6C0-0CE9-4C67-A5CA-7DD13E66DC61}" destId="{B0DFDF3A-EAB6-44DD-82EC-52490D11795F}" srcOrd="3" destOrd="0" parTransId="{30B49095-69B4-4BE1-9F44-A841CB3F5144}" sibTransId="{7C678D87-06D5-462A-A8C1-7B50559310CF}"/>
+    <dgm:cxn modelId="{78496678-1306-47AD-81AC-7558EF7726CB}" srcId="{8CE6A6C0-0CE9-4C67-A5CA-7DD13E66DC61}" destId="{E0C27276-7AE3-4BD3-90FD-B4DF958D1B10}" srcOrd="2" destOrd="0" parTransId="{DD011786-D71F-4180-B5AD-5053A83515F8}" sibTransId="{EAA0DC42-D6F1-442D-8257-84E22AF945C0}"/>
     <dgm:cxn modelId="{CB776209-7E1C-45E1-92DA-D61D72C12C17}" type="presOf" srcId="{E0C27276-7AE3-4BD3-90FD-B4DF958D1B10}" destId="{6CF1026F-10E6-4F46-AA84-AFF599102934}" srcOrd="0" destOrd="0" presId="urn:microsoft.com/office/officeart/2005/8/layout/vList3"/>
-    <dgm:cxn modelId="{E1EC4440-37D9-4421-8BFC-84B0EB16CCC4}" srcId="{8CE6A6C0-0CE9-4C67-A5CA-7DD13E66DC61}" destId="{B0DFDF3A-EAB6-44DD-82EC-52490D11795F}" srcOrd="3" destOrd="0" parTransId="{30B49095-69B4-4BE1-9F44-A841CB3F5144}" sibTransId="{7C678D87-06D5-462A-A8C1-7B50559310CF}"/>
-    <dgm:cxn modelId="{C4256E35-A53B-49D9-9867-A30856AD44C4}" srcId="{8CE6A6C0-0CE9-4C67-A5CA-7DD13E66DC61}" destId="{826954DA-BEDD-4964-B666-0054DADBD264}" srcOrd="1" destOrd="0" parTransId="{305CF992-CFC5-4747-B199-8AE6C2EBEE20}" sibTransId="{151AC144-32A1-4EF7-89F2-AF13775F4448}"/>
-    <dgm:cxn modelId="{ACD756B8-E58A-4072-91FB-2ED742297732}" type="presOf" srcId="{8CE6A6C0-0CE9-4C67-A5CA-7DD13E66DC61}" destId="{D9300EB8-65FB-476B-8CA3-47BB3BD0B524}" srcOrd="0" destOrd="0" presId="urn:microsoft.com/office/officeart/2005/8/layout/vList3"/>
-    <dgm:cxn modelId="{2B3D2357-8665-44B3-8B68-1892DC8E40B7}" type="presOf" srcId="{B0DFDF3A-EAB6-44DD-82EC-52490D11795F}" destId="{ABFC4959-323D-43E6-A058-575E4AF10E6D}" srcOrd="0" destOrd="0" presId="urn:microsoft.com/office/officeart/2005/8/layout/vList3"/>
-    <dgm:cxn modelId="{EA594014-91F1-4CDD-8E58-E70BEBCAC5F2}" type="presOf" srcId="{EC963368-6907-48B7-9F19-8D0DF825B60B}" destId="{DA722338-9A0A-4FA7-A0E1-F1247EC6A1EF}" srcOrd="0" destOrd="0" presId="urn:microsoft.com/office/officeart/2005/8/layout/vList3"/>
-    <dgm:cxn modelId="{78496678-1306-47AD-81AC-7558EF7726CB}" srcId="{8CE6A6C0-0CE9-4C67-A5CA-7DD13E66DC61}" destId="{E0C27276-7AE3-4BD3-90FD-B4DF958D1B10}" srcOrd="2" destOrd="0" parTransId="{DD011786-D71F-4180-B5AD-5053A83515F8}" sibTransId="{EAA0DC42-D6F1-442D-8257-84E22AF945C0}"/>
     <dgm:cxn modelId="{B6CDD53A-62CB-4ACF-B98B-2AB0262CC353}" type="presParOf" srcId="{D9300EB8-65FB-476B-8CA3-47BB3BD0B524}" destId="{BBF4FA76-7652-4810-A9A4-2F602438ABBC}" srcOrd="0" destOrd="0" presId="urn:microsoft.com/office/officeart/2005/8/layout/vList3"/>
     <dgm:cxn modelId="{A01C47D6-E083-4AA3-9C19-9D79C39108CD}" type="presParOf" srcId="{BBF4FA76-7652-4810-A9A4-2F602438ABBC}" destId="{35ACBCBC-1BA4-4430-A6E9-DC25346C6354}" srcOrd="0" destOrd="0" presId="urn:microsoft.com/office/officeart/2005/8/layout/vList3"/>
     <dgm:cxn modelId="{6B3D4BA0-9915-4C92-9881-8F35B6EE8EA4}" type="presParOf" srcId="{BBF4FA76-7652-4810-A9A4-2F602438ABBC}" destId="{DA722338-9A0A-4FA7-A0E1-F1247EC6A1EF}" srcOrd="1" destOrd="0" presId="urn:microsoft.com/office/officeart/2005/8/layout/vList3"/>
@@ -2367,6 +2371,13 @@
         </dgm:presLayoutVars>
       </dgm:prSet>
       <dgm:spPr/>
+      <dgm:t>
+        <a:bodyPr/>
+        <a:lstStyle/>
+        <a:p>
+          <a:endParaRPr lang="en-US"/>
+        </a:p>
+      </dgm:t>
     </dgm:pt>
     <dgm:pt modelId="{DA917715-4CE4-4B25-97B9-2FEC73782B41}" type="pres">
       <dgm:prSet presAssocID="{16AFCAC1-EBC7-4E29-A4D8-190F34814837}" presName="Name1" presStyleCnt="0"/>
@@ -2383,6 +2394,13 @@
     <dgm:pt modelId="{549FB637-3103-4740-BF08-4BEF8E380F5D}" type="pres">
       <dgm:prSet presAssocID="{16AFCAC1-EBC7-4E29-A4D8-190F34814837}" presName="conn" presStyleLbl="parChTrans1D2" presStyleIdx="0" presStyleCnt="1"/>
       <dgm:spPr/>
+      <dgm:t>
+        <a:bodyPr/>
+        <a:lstStyle/>
+        <a:p>
+          <a:endParaRPr lang="en-US"/>
+        </a:p>
+      </dgm:t>
     </dgm:pt>
     <dgm:pt modelId="{3F1C0FD5-FB27-43F7-BD76-8E3BA13322A6}" type="pres">
       <dgm:prSet presAssocID="{16AFCAC1-EBC7-4E29-A4D8-190F34814837}" presName="extraNode" presStyleLbl="node1" presStyleIdx="0" presStyleCnt="6"/>
@@ -2422,6 +2440,13 @@
         </dgm:presLayoutVars>
       </dgm:prSet>
       <dgm:spPr/>
+      <dgm:t>
+        <a:bodyPr/>
+        <a:lstStyle/>
+        <a:p>
+          <a:endParaRPr lang="en-US"/>
+        </a:p>
+      </dgm:t>
     </dgm:pt>
     <dgm:pt modelId="{20E58CAC-5A55-4E1A-93E5-99ED4BB08E88}" type="pres">
       <dgm:prSet presAssocID="{5EE4AD83-8C25-411A-B18B-8426028C5B87}" presName="accent_2" presStyleCnt="0"/>
@@ -2528,15 +2553,15 @@
     <dgm:cxn modelId="{B95D7DF0-3B0F-4FA2-9C17-6B9D7B4983E9}" srcId="{16AFCAC1-EBC7-4E29-A4D8-190F34814837}" destId="{CEA289CA-88B5-4146-9521-4A5C3B79B96A}" srcOrd="5" destOrd="0" parTransId="{03F01D26-485C-4934-84E6-427C549F03DB}" sibTransId="{33171363-ADF9-45F4-BF8F-7ACC593C285C}"/>
     <dgm:cxn modelId="{C968353C-1178-451B-954B-97F3CDD50A61}" type="presOf" srcId="{D3A9355E-3E5C-4C9C-81B4-F19ACA261EB9}" destId="{414D9AC5-4E66-4A7F-BBE8-AE5BA3695CEE}" srcOrd="0" destOrd="0" presId="urn:microsoft.com/office/officeart/2008/layout/VerticalCurvedList"/>
     <dgm:cxn modelId="{B5D076AF-7567-48C2-B5FF-81B1040726B8}" srcId="{16AFCAC1-EBC7-4E29-A4D8-190F34814837}" destId="{2C980301-9FB1-4074-A261-AEC48943FD73}" srcOrd="2" destOrd="0" parTransId="{4AC04F73-9A17-43A2-8EE8-BAEB22EDF6ED}" sibTransId="{C2EC2CF3-5F7D-414A-81F8-DF5C844735AA}"/>
+    <dgm:cxn modelId="{5970B9B9-D78C-460F-A24E-C46B96A3D444}" type="presOf" srcId="{5EE4AD83-8C25-411A-B18B-8426028C5B87}" destId="{D4AE0C56-48AA-4749-9182-EDADE1C05289}" srcOrd="0" destOrd="0" presId="urn:microsoft.com/office/officeart/2008/layout/VerticalCurvedList"/>
     <dgm:cxn modelId="{062CE22F-7F1A-461A-97A3-6F866BDAB6D6}" srcId="{16AFCAC1-EBC7-4E29-A4D8-190F34814837}" destId="{5EE4AD83-8C25-411A-B18B-8426028C5B87}" srcOrd="1" destOrd="0" parTransId="{1FFC30B0-1C3A-4A20-9978-76A5E15DE6ED}" sibTransId="{9D32B68C-7A8C-4819-A200-425E98AF4874}"/>
-    <dgm:cxn modelId="{5970B9B9-D78C-460F-A24E-C46B96A3D444}" type="presOf" srcId="{5EE4AD83-8C25-411A-B18B-8426028C5B87}" destId="{D4AE0C56-48AA-4749-9182-EDADE1C05289}" srcOrd="0" destOrd="0" presId="urn:microsoft.com/office/officeart/2008/layout/VerticalCurvedList"/>
     <dgm:cxn modelId="{BD53649E-34EA-4FBC-8EAE-6CC61ED680EB}" type="presOf" srcId="{5BFF4DCF-E20A-4004-B91F-D97498F18B2D}" destId="{F027E0E3-48CC-4D23-906E-3945C63E9E2C}" srcOrd="0" destOrd="0" presId="urn:microsoft.com/office/officeart/2008/layout/VerticalCurvedList"/>
     <dgm:cxn modelId="{1A4D2C0D-7487-489B-8BD3-9F56BABFFFF4}" srcId="{16AFCAC1-EBC7-4E29-A4D8-190F34814837}" destId="{D3A9355E-3E5C-4C9C-81B4-F19ACA261EB9}" srcOrd="4" destOrd="0" parTransId="{67087A68-CE7D-49B1-BCFD-DAB7D68733CA}" sibTransId="{55A3D7F7-792E-4754-AE60-B4C8AE7D3FF3}"/>
     <dgm:cxn modelId="{724A8BBE-64ED-439A-B7D1-6AB89FBFFFE9}" type="presOf" srcId="{79561C26-B8BC-4A11-B935-D8E82FDC0EB6}" destId="{549FB637-3103-4740-BF08-4BEF8E380F5D}" srcOrd="0" destOrd="0" presId="urn:microsoft.com/office/officeart/2008/layout/VerticalCurvedList"/>
     <dgm:cxn modelId="{D479FE71-1374-4BB6-9845-48014B865C50}" type="presOf" srcId="{2C980301-9FB1-4074-A261-AEC48943FD73}" destId="{AA8E9D90-2EAA-4CBE-BC4B-E87162C2A093}" srcOrd="0" destOrd="0" presId="urn:microsoft.com/office/officeart/2008/layout/VerticalCurvedList"/>
     <dgm:cxn modelId="{9F579687-437F-4057-9E8A-55B95137A3A4}" type="presOf" srcId="{CEA289CA-88B5-4146-9521-4A5C3B79B96A}" destId="{48D615DC-4C88-43B8-B152-E44EF4CC37F1}" srcOrd="0" destOrd="0" presId="urn:microsoft.com/office/officeart/2008/layout/VerticalCurvedList"/>
+    <dgm:cxn modelId="{70B5B282-6D14-40F5-9375-A26DA33F9720}" type="presOf" srcId="{16AFCAC1-EBC7-4E29-A4D8-190F34814837}" destId="{5737C905-7861-44EA-981B-10D45AEAB996}" srcOrd="0" destOrd="0" presId="urn:microsoft.com/office/officeart/2008/layout/VerticalCurvedList"/>
     <dgm:cxn modelId="{EA7C378E-E6DE-4983-9B98-878AEE3B65A5}" srcId="{16AFCAC1-EBC7-4E29-A4D8-190F34814837}" destId="{5BFF4DCF-E20A-4004-B91F-D97498F18B2D}" srcOrd="0" destOrd="0" parTransId="{1322256B-399F-44EB-8047-AEA293E948EC}" sibTransId="{79561C26-B8BC-4A11-B935-D8E82FDC0EB6}"/>
-    <dgm:cxn modelId="{70B5B282-6D14-40F5-9375-A26DA33F9720}" type="presOf" srcId="{16AFCAC1-EBC7-4E29-A4D8-190F34814837}" destId="{5737C905-7861-44EA-981B-10D45AEAB996}" srcOrd="0" destOrd="0" presId="urn:microsoft.com/office/officeart/2008/layout/VerticalCurvedList"/>
     <dgm:cxn modelId="{511CC99D-972A-4125-92EC-6EFD8AF2ABDA}" type="presOf" srcId="{8850572E-5208-4944-B29E-2CFD3F7D9031}" destId="{ECBC9EA4-0C3C-49DB-AE68-787046EB59CE}" srcOrd="0" destOrd="0" presId="urn:microsoft.com/office/officeart/2008/layout/VerticalCurvedList"/>
     <dgm:cxn modelId="{73F546A1-36EC-4482-920D-BD2CBC8B68CD}" srcId="{16AFCAC1-EBC7-4E29-A4D8-190F34814837}" destId="{8850572E-5208-4944-B29E-2CFD3F7D9031}" srcOrd="3" destOrd="0" parTransId="{409A1644-EC60-4B14-AE34-0FEFB6D06652}" sibTransId="{8350B7CE-4915-46B5-BFBD-11BAADB8C334}"/>
     <dgm:cxn modelId="{FC029A33-5A5B-4B0E-AD4F-D1A05F5AEB66}" type="presParOf" srcId="{5737C905-7861-44EA-981B-10D45AEAB996}" destId="{DA917715-4CE4-4B25-97B9-2FEC73782B41}" srcOrd="0" destOrd="0" presId="urn:microsoft.com/office/officeart/2008/layout/VerticalCurvedList"/>
@@ -2709,13 +2734,7 @@
           <a:avLst/>
         </a:prstGeom>
         <a:solidFill>
-          <a:schemeClr val="accent6">
-            <a:tint val="40000"/>
-            <a:hueOff val="0"/>
-            <a:satOff val="0"/>
-            <a:lumOff val="0"/>
-            <a:alphaOff val="0"/>
-          </a:schemeClr>
+          <a:schemeClr val="accent2"/>
         </a:solidFill>
         <a:ln>
           <a:noFill/>
@@ -8202,6 +8221,651 @@
 </p:notes>
 </file>
 
+<file path=ppt/notesSlides/notesSlide2.xml><?xml version="1.0" encoding="utf-8"?>
+<p:notes xmlns:a="http://schemas.openxmlformats.org/drawingml/2006/main" xmlns:r="http://schemas.openxmlformats.org/officeDocument/2006/relationships" xmlns:p="http://schemas.openxmlformats.org/presentationml/2006/main">
+  <p:cSld>
+    <p:spTree>
+      <p:nvGrpSpPr>
+        <p:cNvPr id="1" name=""/>
+        <p:cNvGrpSpPr/>
+        <p:nvPr/>
+      </p:nvGrpSpPr>
+      <p:grpSpPr>
+        <a:xfrm>
+          <a:off x="0" y="0"/>
+          <a:ext cx="0" cy="0"/>
+          <a:chOff x="0" y="0"/>
+          <a:chExt cx="0" cy="0"/>
+        </a:xfrm>
+      </p:grpSpPr>
+      <p:sp>
+        <p:nvSpPr>
+          <p:cNvPr id="2" name="Slide Image Placeholder 1"/>
+          <p:cNvSpPr>
+            <a:spLocks noGrp="1" noRot="1" noChangeAspect="1"/>
+          </p:cNvSpPr>
+          <p:nvPr>
+            <p:ph type="sldImg"/>
+          </p:nvPr>
+        </p:nvSpPr>
+        <p:spPr/>
+      </p:sp>
+      <p:sp>
+        <p:nvSpPr>
+          <p:cNvPr id="3" name="Notes Placeholder 2"/>
+          <p:cNvSpPr>
+            <a:spLocks noGrp="1"/>
+          </p:cNvSpPr>
+          <p:nvPr>
+            <p:ph type="body" idx="1"/>
+          </p:nvPr>
+        </p:nvSpPr>
+        <p:spPr/>
+        <p:txBody>
+          <a:bodyPr/>
+          <a:lstStyle/>
+          <a:p>
+            <a:pPr marL="457200" indent="-457200">
+              <a:buFontTx/>
+              <a:buChar char="-"/>
+            </a:pPr>
+            <a:r>
+              <a:rPr lang="en-US" dirty="0" err="1" smtClean="0"/>
+              <a:t>Tự</a:t>
+            </a:r>
+            <a:r>
+              <a:rPr lang="en-US" dirty="0" smtClean="0"/>
+              <a:t> </a:t>
+            </a:r>
+            <a:r>
+              <a:rPr lang="en-US" dirty="0" err="1" smtClean="0"/>
+              <a:t>động</a:t>
+            </a:r>
+            <a:r>
+              <a:rPr lang="en-US" dirty="0" smtClean="0"/>
+              <a:t> </a:t>
+            </a:r>
+            <a:r>
+              <a:rPr lang="en-US" dirty="0" err="1" smtClean="0"/>
+              <a:t>tìm</a:t>
+            </a:r>
+            <a:r>
+              <a:rPr lang="en-US" dirty="0" smtClean="0"/>
+              <a:t> </a:t>
+            </a:r>
+            <a:r>
+              <a:rPr lang="en-US" dirty="0" err="1" smtClean="0"/>
+              <a:t>kiếm</a:t>
+            </a:r>
+            <a:r>
+              <a:rPr lang="en-US" dirty="0" smtClean="0"/>
+              <a:t> </a:t>
+            </a:r>
+            <a:r>
+              <a:rPr lang="en-US" dirty="0" err="1" smtClean="0"/>
+              <a:t>tài</a:t>
+            </a:r>
+            <a:r>
+              <a:rPr lang="en-US" dirty="0" smtClean="0"/>
+              <a:t> </a:t>
+            </a:r>
+            <a:r>
+              <a:rPr lang="en-US" dirty="0" err="1" smtClean="0"/>
+              <a:t>xế</a:t>
+            </a:r>
+            <a:r>
+              <a:rPr lang="en-US" dirty="0" smtClean="0"/>
+              <a:t>/ </a:t>
+            </a:r>
+            <a:r>
+              <a:rPr lang="en-US" dirty="0" err="1" smtClean="0"/>
+              <a:t>chủ</a:t>
+            </a:r>
+            <a:r>
+              <a:rPr lang="en-US" dirty="0" smtClean="0"/>
+              <a:t> </a:t>
+            </a:r>
+            <a:r>
+              <a:rPr lang="en-US" dirty="0" err="1" smtClean="0"/>
+              <a:t>hàng</a:t>
+            </a:r>
+            <a:r>
+              <a:rPr lang="en-US" dirty="0" smtClean="0"/>
+              <a:t> </a:t>
+            </a:r>
+            <a:r>
+              <a:rPr lang="en-US" dirty="0" err="1" smtClean="0"/>
+              <a:t>phù</a:t>
+            </a:r>
+            <a:r>
+              <a:rPr lang="en-US" dirty="0" smtClean="0"/>
+              <a:t> </a:t>
+            </a:r>
+            <a:r>
+              <a:rPr lang="en-US" dirty="0" err="1" smtClean="0"/>
+              <a:t>hợp</a:t>
+            </a:r>
+            <a:r>
+              <a:rPr lang="en-US" dirty="0" smtClean="0"/>
+              <a:t> </a:t>
+            </a:r>
+            <a:r>
+              <a:rPr lang="en-US" dirty="0" err="1" smtClean="0"/>
+              <a:t>dựa</a:t>
+            </a:r>
+            <a:r>
+              <a:rPr lang="en-US" dirty="0" smtClean="0"/>
+              <a:t> </a:t>
+            </a:r>
+            <a:r>
+              <a:rPr lang="en-US" dirty="0" err="1" smtClean="0"/>
+              <a:t>trên</a:t>
+            </a:r>
+            <a:r>
+              <a:rPr lang="en-US" dirty="0" smtClean="0"/>
+              <a:t> </a:t>
+            </a:r>
+            <a:r>
+              <a:rPr lang="en-US" dirty="0" err="1" smtClean="0"/>
+              <a:t>các</a:t>
+            </a:r>
+            <a:r>
+              <a:rPr lang="en-US" dirty="0" smtClean="0"/>
+              <a:t> </a:t>
+            </a:r>
+            <a:r>
+              <a:rPr lang="en-US" dirty="0" err="1" smtClean="0"/>
+              <a:t>tiêu</a:t>
+            </a:r>
+            <a:r>
+              <a:rPr lang="en-US" dirty="0" smtClean="0"/>
+              <a:t> </a:t>
+            </a:r>
+            <a:r>
+              <a:rPr lang="en-US" dirty="0" err="1" smtClean="0"/>
+              <a:t>chí</a:t>
+            </a:r>
+            <a:r>
+              <a:rPr lang="en-US" dirty="0" smtClean="0"/>
+              <a:t> </a:t>
+            </a:r>
+            <a:r>
+              <a:rPr lang="en-US" dirty="0" err="1" smtClean="0"/>
+              <a:t>có</a:t>
+            </a:r>
+            <a:r>
+              <a:rPr lang="en-US" dirty="0" smtClean="0"/>
+              <a:t> </a:t>
+            </a:r>
+            <a:r>
+              <a:rPr lang="en-US" dirty="0" err="1" smtClean="0"/>
+              <a:t>sẵn</a:t>
+            </a:r>
+            <a:endParaRPr lang="en-US" dirty="0" smtClean="0"/>
+          </a:p>
+          <a:p>
+            <a:pPr marL="457200" indent="-457200">
+              <a:buFontTx/>
+              <a:buChar char="-"/>
+            </a:pPr>
+            <a:r>
+              <a:rPr lang="en-US" dirty="0" err="1" smtClean="0"/>
+              <a:t>Thực</a:t>
+            </a:r>
+            <a:r>
+              <a:rPr lang="en-US" dirty="0" smtClean="0"/>
+              <a:t> </a:t>
+            </a:r>
+            <a:r>
+              <a:rPr lang="en-US" dirty="0" err="1" smtClean="0"/>
+              <a:t>hiện</a:t>
+            </a:r>
+            <a:r>
+              <a:rPr lang="en-US" dirty="0" smtClean="0"/>
+              <a:t> </a:t>
+            </a:r>
+            <a:r>
+              <a:rPr lang="en-US" dirty="0" err="1" smtClean="0"/>
+              <a:t>thỏa</a:t>
+            </a:r>
+            <a:r>
+              <a:rPr lang="en-US" dirty="0" smtClean="0"/>
+              <a:t> </a:t>
+            </a:r>
+            <a:r>
+              <a:rPr lang="en-US" dirty="0" err="1" smtClean="0"/>
+              <a:t>thuận</a:t>
+            </a:r>
+            <a:r>
+              <a:rPr lang="en-US" dirty="0" smtClean="0"/>
+              <a:t> </a:t>
+            </a:r>
+            <a:r>
+              <a:rPr lang="en-US" dirty="0" err="1" smtClean="0"/>
+              <a:t>trực</a:t>
+            </a:r>
+            <a:r>
+              <a:rPr lang="en-US" dirty="0" smtClean="0"/>
+              <a:t> </a:t>
+            </a:r>
+            <a:r>
+              <a:rPr lang="en-US" dirty="0" err="1" smtClean="0"/>
+              <a:t>tiếp</a:t>
+            </a:r>
+            <a:endParaRPr lang="en-US" dirty="0" smtClean="0"/>
+          </a:p>
+          <a:p>
+            <a:pPr marL="457200" indent="-457200">
+              <a:buFontTx/>
+              <a:buChar char="-"/>
+            </a:pPr>
+            <a:r>
+              <a:rPr lang="en-US" dirty="0" err="1" smtClean="0"/>
+              <a:t>Thực</a:t>
+            </a:r>
+            <a:r>
+              <a:rPr lang="en-US" dirty="0" smtClean="0"/>
+              <a:t> </a:t>
+            </a:r>
+            <a:r>
+              <a:rPr lang="en-US" dirty="0" err="1" smtClean="0"/>
+              <a:t>hiện</a:t>
+            </a:r>
+            <a:r>
+              <a:rPr lang="en-US" dirty="0" smtClean="0"/>
+              <a:t> chia </a:t>
+            </a:r>
+            <a:r>
+              <a:rPr lang="en-US" dirty="0" err="1" smtClean="0"/>
+              <a:t>trả</a:t>
+            </a:r>
+            <a:r>
+              <a:rPr lang="en-US" dirty="0" smtClean="0"/>
+              <a:t> </a:t>
+            </a:r>
+            <a:r>
+              <a:rPr lang="en-US" dirty="0" err="1" smtClean="0"/>
+              <a:t>thông</a:t>
+            </a:r>
+            <a:r>
+              <a:rPr lang="en-US" dirty="0" smtClean="0"/>
+              <a:t> qua </a:t>
+            </a:r>
+            <a:r>
+              <a:rPr lang="en-US" dirty="0" err="1" smtClean="0"/>
+              <a:t>hệ</a:t>
+            </a:r>
+            <a:r>
+              <a:rPr lang="en-US" dirty="0" smtClean="0"/>
+              <a:t> </a:t>
+            </a:r>
+            <a:r>
+              <a:rPr lang="en-US" dirty="0" err="1" smtClean="0"/>
+              <a:t>thống</a:t>
+            </a:r>
+            <a:endParaRPr lang="en-US" dirty="0" smtClean="0"/>
+          </a:p>
+          <a:p>
+            <a:endParaRPr lang="en-US" dirty="0"/>
+          </a:p>
+        </p:txBody>
+      </p:sp>
+      <p:sp>
+        <p:nvSpPr>
+          <p:cNvPr id="4" name="Slide Number Placeholder 3"/>
+          <p:cNvSpPr>
+            <a:spLocks noGrp="1"/>
+          </p:cNvSpPr>
+          <p:nvPr>
+            <p:ph type="sldNum" sz="quarter" idx="10"/>
+          </p:nvPr>
+        </p:nvSpPr>
+        <p:spPr/>
+        <p:txBody>
+          <a:bodyPr/>
+          <a:lstStyle/>
+          <a:p>
+            <a:fld id="{9D80E15B-F26A-4123-AB0E-BAB20F559873}" type="slidenum">
+              <a:rPr lang="en-US" smtClean="0"/>
+              <a:t>7</a:t>
+            </a:fld>
+            <a:endParaRPr lang="en-US"/>
+          </a:p>
+        </p:txBody>
+      </p:sp>
+    </p:spTree>
+    <p:extLst>
+      <p:ext uri="{BB962C8B-B14F-4D97-AF65-F5344CB8AC3E}">
+        <p14:creationId xmlns:p14="http://schemas.microsoft.com/office/powerpoint/2010/main" val="3973325848"/>
+      </p:ext>
+    </p:extLst>
+  </p:cSld>
+  <p:clrMapOvr>
+    <a:masterClrMapping/>
+  </p:clrMapOvr>
+</p:notes>
+</file>
+
+<file path=ppt/notesSlides/notesSlide3.xml><?xml version="1.0" encoding="utf-8"?>
+<p:notes xmlns:a="http://schemas.openxmlformats.org/drawingml/2006/main" xmlns:r="http://schemas.openxmlformats.org/officeDocument/2006/relationships" xmlns:p="http://schemas.openxmlformats.org/presentationml/2006/main">
+  <p:cSld>
+    <p:spTree>
+      <p:nvGrpSpPr>
+        <p:cNvPr id="1" name=""/>
+        <p:cNvGrpSpPr/>
+        <p:nvPr/>
+      </p:nvGrpSpPr>
+      <p:grpSpPr>
+        <a:xfrm>
+          <a:off x="0" y="0"/>
+          <a:ext cx="0" cy="0"/>
+          <a:chOff x="0" y="0"/>
+          <a:chExt cx="0" cy="0"/>
+        </a:xfrm>
+      </p:grpSpPr>
+      <p:sp>
+        <p:nvSpPr>
+          <p:cNvPr id="2" name="Slide Image Placeholder 1"/>
+          <p:cNvSpPr>
+            <a:spLocks noGrp="1" noRot="1" noChangeAspect="1"/>
+          </p:cNvSpPr>
+          <p:nvPr>
+            <p:ph type="sldImg"/>
+          </p:nvPr>
+        </p:nvSpPr>
+        <p:spPr/>
+      </p:sp>
+      <p:sp>
+        <p:nvSpPr>
+          <p:cNvPr id="3" name="Notes Placeholder 2"/>
+          <p:cNvSpPr>
+            <a:spLocks noGrp="1"/>
+          </p:cNvSpPr>
+          <p:nvPr>
+            <p:ph type="body" idx="1"/>
+          </p:nvPr>
+        </p:nvSpPr>
+        <p:spPr/>
+        <p:txBody>
+          <a:bodyPr/>
+          <a:lstStyle/>
+          <a:p>
+            <a:pPr marL="457200" indent="-457200">
+              <a:buFontTx/>
+              <a:buChar char="-"/>
+            </a:pPr>
+            <a:r>
+              <a:rPr lang="en-US" sz="1200" dirty="0" err="1" smtClean="0"/>
+              <a:t>Chủ</a:t>
+            </a:r>
+            <a:r>
+              <a:rPr lang="en-US" sz="1200" dirty="0" smtClean="0"/>
+              <a:t> </a:t>
+            </a:r>
+            <a:r>
+              <a:rPr lang="en-US" sz="1200" dirty="0" err="1" smtClean="0"/>
+              <a:t>hàng</a:t>
+            </a:r>
+            <a:r>
+              <a:rPr lang="en-US" sz="1200" dirty="0" smtClean="0"/>
+              <a:t> </a:t>
+            </a:r>
+            <a:r>
+              <a:rPr lang="en-US" sz="1200" dirty="0" err="1" smtClean="0"/>
+              <a:t>có</a:t>
+            </a:r>
+            <a:r>
+              <a:rPr lang="en-US" sz="1200" dirty="0" smtClean="0"/>
+              <a:t> </a:t>
+            </a:r>
+            <a:r>
+              <a:rPr lang="en-US" sz="1200" dirty="0" err="1" smtClean="0"/>
+              <a:t>thể</a:t>
+            </a:r>
+            <a:r>
+              <a:rPr lang="en-US" sz="1200" dirty="0" smtClean="0"/>
+              <a:t> </a:t>
+            </a:r>
+            <a:r>
+              <a:rPr lang="en-US" sz="1200" dirty="0" err="1" smtClean="0"/>
+              <a:t>tìm</a:t>
+            </a:r>
+            <a:r>
+              <a:rPr lang="en-US" sz="1200" dirty="0" smtClean="0"/>
+              <a:t> </a:t>
+            </a:r>
+            <a:r>
+              <a:rPr lang="en-US" sz="1200" dirty="0" err="1" smtClean="0"/>
+              <a:t>được</a:t>
+            </a:r>
+            <a:r>
+              <a:rPr lang="en-US" sz="1200" dirty="0" smtClean="0"/>
+              <a:t> </a:t>
+            </a:r>
+            <a:r>
+              <a:rPr lang="en-US" sz="1200" dirty="0" err="1" smtClean="0"/>
+              <a:t>xe</a:t>
+            </a:r>
+            <a:r>
+              <a:rPr lang="en-US" sz="1200" dirty="0" smtClean="0"/>
+              <a:t> </a:t>
+            </a:r>
+            <a:r>
+              <a:rPr lang="en-US" sz="1200" dirty="0" err="1" smtClean="0"/>
+              <a:t>vận</a:t>
+            </a:r>
+            <a:r>
+              <a:rPr lang="en-US" sz="1200" dirty="0" smtClean="0"/>
+              <a:t> </a:t>
+            </a:r>
+            <a:r>
+              <a:rPr lang="en-US" sz="1200" dirty="0" err="1" smtClean="0"/>
+              <a:t>chuyển</a:t>
+            </a:r>
+            <a:r>
+              <a:rPr lang="en-US" sz="1200" dirty="0" smtClean="0"/>
+              <a:t> </a:t>
+            </a:r>
+            <a:r>
+              <a:rPr lang="en-US" sz="1200" dirty="0" err="1" smtClean="0"/>
+              <a:t>nhanh</a:t>
+            </a:r>
+            <a:r>
+              <a:rPr lang="en-US" sz="1200" dirty="0" smtClean="0"/>
+              <a:t> </a:t>
+            </a:r>
+            <a:r>
+              <a:rPr lang="en-US" sz="1200" dirty="0" err="1" smtClean="0"/>
+              <a:t>chóng</a:t>
+            </a:r>
+            <a:r>
+              <a:rPr lang="en-US" sz="1200" dirty="0" smtClean="0"/>
+              <a:t> </a:t>
+            </a:r>
+          </a:p>
+          <a:p>
+            <a:pPr marL="457200" indent="-457200">
+              <a:buFontTx/>
+              <a:buChar char="-"/>
+            </a:pPr>
+            <a:r>
+              <a:rPr lang="en-US" sz="1200" dirty="0" err="1" smtClean="0"/>
+              <a:t>Đảm</a:t>
+            </a:r>
+            <a:r>
+              <a:rPr lang="en-US" sz="1200" dirty="0" smtClean="0"/>
+              <a:t> </a:t>
+            </a:r>
+            <a:r>
+              <a:rPr lang="en-US" sz="1200" dirty="0" err="1" smtClean="0"/>
+              <a:t>bảo</a:t>
+            </a:r>
+            <a:r>
+              <a:rPr lang="en-US" sz="1200" dirty="0" smtClean="0"/>
+              <a:t> </a:t>
+            </a:r>
+            <a:r>
+              <a:rPr lang="en-US" sz="1200" dirty="0" err="1" smtClean="0"/>
+              <a:t>hàng</a:t>
+            </a:r>
+            <a:r>
+              <a:rPr lang="en-US" sz="1200" dirty="0" smtClean="0"/>
+              <a:t> </a:t>
+            </a:r>
+            <a:r>
+              <a:rPr lang="en-US" sz="1200" dirty="0" err="1" smtClean="0"/>
+              <a:t>hóa</a:t>
+            </a:r>
+            <a:r>
+              <a:rPr lang="en-US" sz="1200" dirty="0" smtClean="0"/>
+              <a:t> </a:t>
+            </a:r>
+            <a:r>
+              <a:rPr lang="en-US" sz="1200" dirty="0" err="1" smtClean="0"/>
+              <a:t>được</a:t>
+            </a:r>
+            <a:r>
+              <a:rPr lang="en-US" sz="1200" dirty="0" smtClean="0"/>
+              <a:t> </a:t>
+            </a:r>
+            <a:r>
+              <a:rPr lang="en-US" sz="1200" dirty="0" err="1" smtClean="0"/>
+              <a:t>vận</a:t>
+            </a:r>
+            <a:r>
+              <a:rPr lang="en-US" sz="1200" dirty="0" smtClean="0"/>
+              <a:t> </a:t>
+            </a:r>
+            <a:r>
+              <a:rPr lang="en-US" sz="1200" dirty="0" err="1" smtClean="0"/>
+              <a:t>chuyển</a:t>
+            </a:r>
+            <a:r>
+              <a:rPr lang="en-US" sz="1200" dirty="0" smtClean="0"/>
+              <a:t> </a:t>
+            </a:r>
+            <a:r>
+              <a:rPr lang="en-US" sz="1200" dirty="0" err="1" smtClean="0"/>
+              <a:t>cẩn</a:t>
+            </a:r>
+            <a:r>
+              <a:rPr lang="en-US" sz="1200" dirty="0" smtClean="0"/>
+              <a:t> </a:t>
+            </a:r>
+            <a:r>
+              <a:rPr lang="en-US" sz="1200" dirty="0" err="1" smtClean="0"/>
+              <a:t>thận</a:t>
+            </a:r>
+            <a:endParaRPr lang="en-US" sz="1200" dirty="0" smtClean="0"/>
+          </a:p>
+          <a:p>
+            <a:pPr marL="457200" indent="-457200">
+              <a:buFontTx/>
+              <a:buChar char="-"/>
+            </a:pPr>
+            <a:r>
+              <a:rPr lang="en-US" sz="1200" dirty="0" err="1" smtClean="0"/>
+              <a:t>Tăng</a:t>
+            </a:r>
+            <a:r>
+              <a:rPr lang="en-US" sz="1200" dirty="0" smtClean="0"/>
+              <a:t> </a:t>
+            </a:r>
+            <a:r>
+              <a:rPr lang="en-US" sz="1200" dirty="0" err="1" smtClean="0"/>
+              <a:t>thu</a:t>
+            </a:r>
+            <a:r>
+              <a:rPr lang="en-US" sz="1200" dirty="0" smtClean="0"/>
+              <a:t> </a:t>
+            </a:r>
+            <a:r>
+              <a:rPr lang="en-US" sz="1200" dirty="0" err="1" smtClean="0"/>
+              <a:t>nhập</a:t>
+            </a:r>
+            <a:r>
+              <a:rPr lang="en-US" sz="1200" dirty="0" smtClean="0"/>
+              <a:t> </a:t>
+            </a:r>
+            <a:r>
+              <a:rPr lang="en-US" sz="1200" dirty="0" err="1" smtClean="0"/>
+              <a:t>cho</a:t>
+            </a:r>
+            <a:r>
+              <a:rPr lang="en-US" sz="1200" dirty="0" smtClean="0"/>
+              <a:t> </a:t>
+            </a:r>
+            <a:r>
+              <a:rPr lang="en-US" sz="1200" dirty="0" err="1" smtClean="0"/>
+              <a:t>tài</a:t>
+            </a:r>
+            <a:r>
+              <a:rPr lang="en-US" sz="1200" dirty="0" smtClean="0"/>
+              <a:t> </a:t>
+            </a:r>
+            <a:r>
+              <a:rPr lang="en-US" sz="1200" dirty="0" err="1" smtClean="0"/>
+              <a:t>xế</a:t>
+            </a:r>
+            <a:r>
+              <a:rPr lang="en-US" sz="1200" dirty="0" smtClean="0"/>
+              <a:t> </a:t>
+            </a:r>
+            <a:r>
+              <a:rPr lang="en-US" sz="1200" dirty="0" err="1" smtClean="0"/>
+              <a:t>xe</a:t>
+            </a:r>
+            <a:r>
+              <a:rPr lang="en-US" sz="1200" dirty="0" smtClean="0"/>
+              <a:t> </a:t>
+            </a:r>
+            <a:r>
+              <a:rPr lang="en-US" sz="1200" dirty="0" err="1" smtClean="0"/>
+              <a:t>tải</a:t>
+            </a:r>
+            <a:endParaRPr lang="en-US" sz="1200" dirty="0" smtClean="0"/>
+          </a:p>
+          <a:p>
+            <a:endParaRPr lang="en-US" dirty="0"/>
+          </a:p>
+        </p:txBody>
+      </p:sp>
+      <p:sp>
+        <p:nvSpPr>
+          <p:cNvPr id="4" name="Slide Number Placeholder 3"/>
+          <p:cNvSpPr>
+            <a:spLocks noGrp="1"/>
+          </p:cNvSpPr>
+          <p:nvPr>
+            <p:ph type="sldNum" sz="quarter" idx="10"/>
+          </p:nvPr>
+        </p:nvSpPr>
+        <p:spPr/>
+        <p:txBody>
+          <a:bodyPr/>
+          <a:lstStyle/>
+          <a:p>
+            <a:fld id="{9D80E15B-F26A-4123-AB0E-BAB20F559873}" type="slidenum">
+              <a:rPr lang="en-US" smtClean="0"/>
+              <a:t>9</a:t>
+            </a:fld>
+            <a:endParaRPr lang="en-US"/>
+          </a:p>
+        </p:txBody>
+      </p:sp>
+    </p:spTree>
+    <p:extLst>
+      <p:ext uri="{BB962C8B-B14F-4D97-AF65-F5344CB8AC3E}">
+        <p14:creationId xmlns:p14="http://schemas.microsoft.com/office/powerpoint/2010/main" val="1268945266"/>
+      </p:ext>
+    </p:extLst>
+  </p:cSld>
+  <p:clrMapOvr>
+    <a:masterClrMapping/>
+  </p:clrMapOvr>
+</p:notes>
+</file>
+
 <file path=ppt/slideLayouts/slideLayout1.xml><?xml version="1.0" encoding="utf-8"?>
 <p:sldLayout xmlns:a="http://schemas.openxmlformats.org/drawingml/2006/main" xmlns:r="http://schemas.openxmlformats.org/officeDocument/2006/relationships" xmlns:p="http://schemas.openxmlformats.org/presentationml/2006/main" showMasterSp="0" type="title" preserve="1">
   <p:cSld name="Title Slide">
@@ -14461,7 +15125,7 @@
           <p:nvPr>
             <p:extLst>
               <p:ext uri="{D42A27DB-BD31-4B8C-83A1-F6EECF244321}">
-                <p14:modId xmlns:p14="http://schemas.microsoft.com/office/powerpoint/2010/main" val="1228837411"/>
+                <p14:modId xmlns:p14="http://schemas.microsoft.com/office/powerpoint/2010/main" val="507697965"/>
               </p:ext>
             </p:extLst>
           </p:nvPr>
@@ -14530,7 +15194,7 @@
       </p:grpSpPr>
       <p:sp>
         <p:nvSpPr>
-          <p:cNvPr id="2" name="Title 1"/>
+          <p:cNvPr id="13" name="Title 1"/>
           <p:cNvSpPr>
             <a:spLocks noGrp="1"/>
           </p:cNvSpPr>
@@ -14540,8 +15204,8 @@
         </p:nvSpPr>
         <p:spPr>
           <a:xfrm>
-            <a:off x="748047" y="1485586"/>
-            <a:ext cx="10515600" cy="1325563"/>
+            <a:off x="786398" y="483401"/>
+            <a:ext cx="4578082" cy="817764"/>
           </a:xfrm>
         </p:spPr>
         <p:txBody>
@@ -14552,74 +15216,27 @@
           <a:p>
             <a:pPr algn="ctr"/>
             <a:r>
-              <a:rPr lang="en-US" sz="4000" b="1" smtClean="0">
-                <a:latin typeface="+mn-lt"/>
+              <a:rPr lang="en-US" b="1" dirty="0" smtClean="0">
+                <a:solidFill>
+                  <a:schemeClr val="tx2"/>
+                </a:solidFill>
+                <a:latin typeface="Berlin Sans FB Demi" panose="020E0802020502020306" pitchFamily="34" charset="0"/>
               </a:rPr>
-              <a:t>ƯU ĐIỂM</a:t>
-            </a:r>
-            <a:endParaRPr lang="en-US" sz="4000" b="1">
-              <a:latin typeface="+mn-lt"/>
+              <a:t>WORKFLOW</a:t>
+            </a:r>
+            <a:endParaRPr lang="en-US" sz="4000" b="1" dirty="0">
+              <a:solidFill>
+                <a:schemeClr val="tx2"/>
+              </a:solidFill>
+              <a:latin typeface="Berlin Sans FB Demi" panose="020E0802020502020306" pitchFamily="34" charset="0"/>
             </a:endParaRPr>
-          </a:p>
-        </p:txBody>
-      </p:sp>
-      <p:sp>
-        <p:nvSpPr>
-          <p:cNvPr id="4" name="TextBox 3"/>
-          <p:cNvSpPr txBox="1"/>
-          <p:nvPr/>
-        </p:nvSpPr>
-        <p:spPr>
-          <a:xfrm>
-            <a:off x="1687806" y="2811149"/>
-            <a:ext cx="8636082" cy="1384995"/>
-          </a:xfrm>
-          <a:prstGeom prst="rect">
-            <a:avLst/>
-          </a:prstGeom>
-          <a:noFill/>
-        </p:spPr>
-        <p:txBody>
-          <a:bodyPr wrap="none" rtlCol="0">
-            <a:spAutoFit/>
-          </a:bodyPr>
-          <a:lstStyle/>
-          <a:p>
-            <a:pPr marL="457200" indent="-457200">
-              <a:buFontTx/>
-              <a:buChar char="-"/>
-            </a:pPr>
-            <a:r>
-              <a:rPr lang="en-US" sz="2800" smtClean="0"/>
-              <a:t>Chủ hàng có thể tìm được xe vận chuyển nhanh chóng </a:t>
-            </a:r>
-          </a:p>
-          <a:p>
-            <a:pPr marL="457200" indent="-457200">
-              <a:buFontTx/>
-              <a:buChar char="-"/>
-            </a:pPr>
-            <a:r>
-              <a:rPr lang="en-US" sz="2800" smtClean="0"/>
-              <a:t>Đảm bảo hàng hóa được vận chuyển cẩn thận</a:t>
-            </a:r>
-          </a:p>
-          <a:p>
-            <a:pPr marL="457200" indent="-457200">
-              <a:buFontTx/>
-              <a:buChar char="-"/>
-            </a:pPr>
-            <a:r>
-              <a:rPr lang="en-US" sz="2800" smtClean="0"/>
-              <a:t>Tăng thu nhập cho tài xế xe tải</a:t>
-            </a:r>
           </a:p>
         </p:txBody>
       </p:sp>
     </p:spTree>
     <p:extLst>
       <p:ext uri="{BB962C8B-B14F-4D97-AF65-F5344CB8AC3E}">
-        <p14:creationId xmlns:p14="http://schemas.microsoft.com/office/powerpoint/2010/main" val="3478636801"/>
+        <p14:creationId xmlns:p14="http://schemas.microsoft.com/office/powerpoint/2010/main" val="2265489502"/>
       </p:ext>
     </p:extLst>
   </p:cSld>
@@ -14690,38 +15307,8 @@
         </p:blipFill>
         <p:spPr>
           <a:xfrm>
-            <a:off x="4573567" y="2322287"/>
+            <a:off x="5260105" y="2517549"/>
             <a:ext cx="2655146" cy="2655146"/>
-          </a:xfrm>
-          <a:prstGeom prst="rect">
-            <a:avLst/>
-          </a:prstGeom>
-        </p:spPr>
-      </p:pic>
-      <p:pic>
-        <p:nvPicPr>
-          <p:cNvPr id="29" name="Picture 28"/>
-          <p:cNvPicPr>
-            <a:picLocks noChangeAspect="1"/>
-          </p:cNvPicPr>
-          <p:nvPr/>
-        </p:nvPicPr>
-        <p:blipFill>
-          <a:blip r:embed="rId4">
-            <a:extLst>
-              <a:ext uri="{28A0092B-C50C-407E-A947-70E740481C1C}">
-                <a14:useLocalDpi xmlns:a14="http://schemas.microsoft.com/office/drawing/2010/main" val="0"/>
-              </a:ext>
-            </a:extLst>
-          </a:blip>
-          <a:stretch>
-            <a:fillRect/>
-          </a:stretch>
-        </p:blipFill>
-        <p:spPr>
-          <a:xfrm>
-            <a:off x="2074572" y="1072046"/>
-            <a:ext cx="914400" cy="914400"/>
           </a:xfrm>
           <a:prstGeom prst="rect">
             <a:avLst/>
@@ -14737,7 +15324,7 @@
           <p:nvPr/>
         </p:nvPicPr>
         <p:blipFill>
-          <a:blip r:embed="rId5" cstate="print">
+          <a:blip r:embed="rId4" cstate="print">
             <a:extLst>
               <a:ext uri="{28A0092B-C50C-407E-A947-70E740481C1C}">
                 <a14:useLocalDpi xmlns:a14="http://schemas.microsoft.com/office/drawing/2010/main" val="0"/>
@@ -14750,7 +15337,7 @@
         </p:blipFill>
         <p:spPr>
           <a:xfrm>
-            <a:off x="8776912" y="865447"/>
+            <a:off x="9203632" y="1155007"/>
             <a:ext cx="1442434" cy="1327597"/>
           </a:xfrm>
           <a:prstGeom prst="rect">
@@ -14760,14 +15347,14 @@
       </p:pic>
       <p:sp>
         <p:nvSpPr>
-          <p:cNvPr id="31" name="TextBox 30"/>
+          <p:cNvPr id="32" name="TextBox 31"/>
           <p:cNvSpPr txBox="1"/>
           <p:nvPr/>
         </p:nvSpPr>
         <p:spPr>
           <a:xfrm>
-            <a:off x="979868" y="2000388"/>
-            <a:ext cx="3103808" cy="1200329"/>
+            <a:off x="7320580" y="2269244"/>
+            <a:ext cx="4322780" cy="1015663"/>
           </a:xfrm>
           <a:prstGeom prst="rect">
             <a:avLst/>
@@ -14781,286 +15368,692 @@
           <a:lstStyle/>
           <a:p>
             <a:r>
-              <a:rPr lang="en-US" dirty="0" err="1" smtClean="0"/>
-              <a:t>Chủ</a:t>
-            </a:r>
-            <a:r>
-              <a:rPr lang="en-US" dirty="0" smtClean="0"/>
-              <a:t> </a:t>
-            </a:r>
-            <a:r>
-              <a:rPr lang="en-US" dirty="0" err="1" smtClean="0"/>
-              <a:t>hàng</a:t>
-            </a:r>
-            <a:r>
-              <a:rPr lang="en-US" dirty="0" smtClean="0"/>
-              <a:t> </a:t>
-            </a:r>
-            <a:r>
-              <a:rPr lang="en-US" dirty="0" err="1" smtClean="0"/>
-              <a:t>Thắng</a:t>
-            </a:r>
-            <a:r>
-              <a:rPr lang="en-US" dirty="0" smtClean="0"/>
-              <a:t>	</a:t>
-            </a:r>
+              <a:rPr lang="en-US" sz="2000" b="1" dirty="0" smtClean="0">
+                <a:solidFill>
+                  <a:schemeClr val="tx2"/>
+                </a:solidFill>
+              </a:rPr>
+              <a:t>Truck Driver: </a:t>
+            </a:r>
+            <a:r>
+              <a:rPr lang="en-US" sz="2000" b="1" dirty="0" err="1" smtClean="0">
+                <a:solidFill>
+                  <a:schemeClr val="tx2"/>
+                </a:solidFill>
+              </a:rPr>
+              <a:t>Quân</a:t>
+            </a:r>
+            <a:endParaRPr lang="en-US" sz="2000" b="1" dirty="0" smtClean="0">
+              <a:solidFill>
+                <a:schemeClr val="tx2"/>
+              </a:solidFill>
+            </a:endParaRPr>
           </a:p>
           <a:p>
             <a:r>
-              <a:rPr lang="en-US" dirty="0" smtClean="0"/>
-              <a:t>4 </a:t>
-            </a:r>
-            <a:r>
-              <a:rPr lang="en-US" dirty="0" err="1" smtClean="0"/>
-              <a:t>tấn</a:t>
-            </a:r>
-            <a:r>
-              <a:rPr lang="en-US" dirty="0" smtClean="0"/>
-              <a:t> </a:t>
-            </a:r>
-            <a:r>
-              <a:rPr lang="en-US" dirty="0" err="1" smtClean="0"/>
-              <a:t>hàng</a:t>
-            </a:r>
-            <a:r>
-              <a:rPr lang="en-US" dirty="0" smtClean="0"/>
-              <a:t> </a:t>
-            </a:r>
-            <a:r>
-              <a:rPr lang="en-US" dirty="0" err="1" smtClean="0"/>
-              <a:t>nông</a:t>
-            </a:r>
-            <a:r>
-              <a:rPr lang="en-US" dirty="0" smtClean="0"/>
-              <a:t> </a:t>
-            </a:r>
-            <a:r>
-              <a:rPr lang="en-US" dirty="0" err="1" smtClean="0"/>
-              <a:t>sản</a:t>
-            </a:r>
-            <a:r>
-              <a:rPr lang="en-US" dirty="0" smtClean="0"/>
-              <a:t> </a:t>
-            </a:r>
-            <a:r>
-              <a:rPr lang="en-US" dirty="0" err="1" smtClean="0"/>
-              <a:t>gốm</a:t>
-            </a:r>
-            <a:r>
-              <a:rPr lang="en-US" dirty="0" smtClean="0"/>
-              <a:t> </a:t>
-            </a:r>
-            <a:r>
-              <a:rPr lang="en-US" dirty="0" err="1" smtClean="0"/>
-              <a:t>sứ</a:t>
-            </a:r>
-            <a:endParaRPr lang="en-US" dirty="0" smtClean="0"/>
+              <a:rPr lang="en-US" sz="2000" b="1" dirty="0" smtClean="0">
+                <a:solidFill>
+                  <a:schemeClr val="tx2"/>
+                </a:solidFill>
+              </a:rPr>
+              <a:t>Payload: 10 tones</a:t>
+            </a:r>
+            <a:endParaRPr lang="en-US" sz="2000" b="1" dirty="0" smtClean="0">
+              <a:solidFill>
+                <a:schemeClr val="tx2"/>
+              </a:solidFill>
+            </a:endParaRPr>
           </a:p>
           <a:p>
             <a:r>
-              <a:rPr lang="en-US" dirty="0" smtClean="0"/>
-              <a:t>TP </a:t>
-            </a:r>
-            <a:r>
-              <a:rPr lang="en-US" dirty="0" err="1" smtClean="0"/>
-              <a:t>Huế</a:t>
-            </a:r>
-            <a:r>
-              <a:rPr lang="en-US" dirty="0" smtClean="0"/>
-              <a:t>, </a:t>
-            </a:r>
-            <a:r>
-              <a:rPr lang="en-US" dirty="0" err="1" smtClean="0"/>
-              <a:t>Thừa</a:t>
-            </a:r>
-            <a:r>
-              <a:rPr lang="en-US" dirty="0" smtClean="0"/>
+              <a:rPr lang="en-US" sz="2000" b="1" dirty="0" smtClean="0">
+                <a:solidFill>
+                  <a:schemeClr val="tx2"/>
+                </a:solidFill>
+              </a:rPr>
+              <a:t>Cao </a:t>
+            </a:r>
+            <a:r>
+              <a:rPr lang="en-US" sz="2000" b="1" dirty="0" err="1" smtClean="0">
+                <a:solidFill>
+                  <a:schemeClr val="tx2"/>
+                </a:solidFill>
+              </a:rPr>
+              <a:t>Bằng</a:t>
+            </a:r>
+            <a:r>
+              <a:rPr lang="en-US" sz="2000" b="1" dirty="0" smtClean="0">
+                <a:solidFill>
+                  <a:schemeClr val="tx2"/>
+                </a:solidFill>
+              </a:rPr>
               <a:t> </a:t>
             </a:r>
             <a:r>
-              <a:rPr lang="en-US" dirty="0" err="1" smtClean="0"/>
-              <a:t>Thiên</a:t>
-            </a:r>
-            <a:r>
-              <a:rPr lang="en-US" dirty="0" smtClean="0"/>
+              <a:rPr lang="en-US" sz="2000" b="1" dirty="0" smtClean="0">
+                <a:solidFill>
+                  <a:schemeClr val="tx2"/>
+                </a:solidFill>
+              </a:rPr>
+              <a:t>– </a:t>
+            </a:r>
+            <a:r>
+              <a:rPr lang="en-US" sz="2000" b="1" dirty="0" err="1" smtClean="0">
+                <a:solidFill>
+                  <a:schemeClr val="tx2"/>
+                </a:solidFill>
+              </a:rPr>
+              <a:t>Vinh</a:t>
+            </a:r>
+            <a:r>
+              <a:rPr lang="en-US" sz="2000" b="1" dirty="0">
+                <a:solidFill>
+                  <a:schemeClr val="tx2"/>
+                </a:solidFill>
+              </a:rPr>
               <a:t> </a:t>
             </a:r>
             <a:r>
-              <a:rPr lang="en-US" dirty="0" err="1" smtClean="0"/>
-              <a:t>Huế</a:t>
-            </a:r>
-            <a:r>
-              <a:rPr lang="en-US" dirty="0" smtClean="0"/>
-              <a:t> - TP Cam </a:t>
-            </a:r>
-            <a:r>
-              <a:rPr lang="en-US" dirty="0" err="1" smtClean="0"/>
-              <a:t>Ranh</a:t>
-            </a:r>
-            <a:r>
-              <a:rPr lang="en-US" dirty="0" smtClean="0"/>
-              <a:t>, </a:t>
-            </a:r>
-            <a:r>
-              <a:rPr lang="en-US" dirty="0" err="1" smtClean="0"/>
-              <a:t>tỉnh</a:t>
-            </a:r>
-            <a:r>
-              <a:rPr lang="en-US" dirty="0" smtClean="0"/>
-              <a:t> Khánh </a:t>
-            </a:r>
-            <a:r>
-              <a:rPr lang="en-US" dirty="0" err="1" smtClean="0"/>
+              <a:rPr lang="en-US" sz="2000" b="1" dirty="0" smtClean="0">
+                <a:solidFill>
+                  <a:schemeClr val="tx2"/>
+                </a:solidFill>
+              </a:rPr>
+              <a:t>- </a:t>
+            </a:r>
+            <a:r>
+              <a:rPr lang="en-US" sz="2000" b="1" dirty="0" err="1" smtClean="0">
+                <a:solidFill>
+                  <a:schemeClr val="tx2"/>
+                </a:solidFill>
+              </a:rPr>
+              <a:t>Hội</a:t>
+            </a:r>
+            <a:r>
+              <a:rPr lang="en-US" sz="2000" b="1" dirty="0" smtClean="0">
+                <a:solidFill>
+                  <a:schemeClr val="tx2"/>
+                </a:solidFill>
+              </a:rPr>
+              <a:t> </a:t>
+            </a:r>
+            <a:r>
+              <a:rPr lang="en-US" sz="2000" b="1" dirty="0" smtClean="0">
+                <a:solidFill>
+                  <a:schemeClr val="tx2"/>
+                </a:solidFill>
+              </a:rPr>
+              <a:t>An - Khánh </a:t>
+            </a:r>
+            <a:r>
+              <a:rPr lang="en-US" sz="2000" b="1" dirty="0" err="1" smtClean="0">
+                <a:solidFill>
+                  <a:schemeClr val="tx2"/>
+                </a:solidFill>
+              </a:rPr>
               <a:t>Hòa</a:t>
             </a:r>
-            <a:endParaRPr lang="en-US" dirty="0" smtClean="0"/>
+            <a:endParaRPr lang="en-US" sz="2000" b="1" dirty="0" smtClean="0">
+              <a:solidFill>
+                <a:schemeClr val="tx2"/>
+              </a:solidFill>
+            </a:endParaRPr>
           </a:p>
         </p:txBody>
       </p:sp>
-      <p:sp>
-        <p:nvSpPr>
-          <p:cNvPr id="32" name="TextBox 31"/>
-          <p:cNvSpPr txBox="1"/>
+      <p:grpSp>
+        <p:nvGrpSpPr>
+          <p:cNvPr id="2" name="Group 1"/>
+          <p:cNvGrpSpPr/>
           <p:nvPr/>
-        </p:nvSpPr>
-        <p:spPr>
+        </p:nvGrpSpPr>
+        <p:grpSpPr>
           <a:xfrm>
-            <a:off x="7489024" y="2193044"/>
-            <a:ext cx="4018209" cy="1200329"/>
+            <a:off x="1742973" y="1270166"/>
+            <a:ext cx="5144996" cy="4664587"/>
+            <a:chOff x="1655413" y="1072046"/>
+            <a:chExt cx="4490187" cy="4664587"/>
           </a:xfrm>
-          <a:prstGeom prst="rect">
-            <a:avLst/>
-          </a:prstGeom>
-          <a:noFill/>
-        </p:spPr>
-        <p:txBody>
-          <a:bodyPr wrap="square" rtlCol="0">
-            <a:spAutoFit/>
-          </a:bodyPr>
-          <a:lstStyle/>
-          <a:p>
-            <a:r>
-              <a:rPr lang="en-US" dirty="0" err="1" smtClean="0"/>
-              <a:t>Tài</a:t>
-            </a:r>
-            <a:r>
-              <a:rPr lang="en-US" dirty="0" smtClean="0"/>
-              <a:t> </a:t>
-            </a:r>
-            <a:r>
-              <a:rPr lang="en-US" dirty="0" err="1" smtClean="0"/>
-              <a:t>xế</a:t>
-            </a:r>
-            <a:r>
-              <a:rPr lang="en-US" dirty="0" smtClean="0"/>
-              <a:t> </a:t>
-            </a:r>
-            <a:r>
-              <a:rPr lang="en-US" dirty="0" err="1" smtClean="0"/>
-              <a:t>Quân</a:t>
-            </a:r>
-            <a:endParaRPr lang="en-US" dirty="0" smtClean="0"/>
-          </a:p>
-          <a:p>
-            <a:r>
-              <a:rPr lang="en-US" dirty="0" err="1" smtClean="0"/>
-              <a:t>Xe</a:t>
-            </a:r>
-            <a:r>
-              <a:rPr lang="en-US" dirty="0" smtClean="0"/>
-              <a:t> </a:t>
-            </a:r>
-            <a:r>
-              <a:rPr lang="en-US" dirty="0" err="1" smtClean="0"/>
-              <a:t>tải</a:t>
-            </a:r>
-            <a:r>
-              <a:rPr lang="en-US" dirty="0" smtClean="0"/>
-              <a:t> 10 </a:t>
-            </a:r>
-            <a:r>
-              <a:rPr lang="en-US" dirty="0" err="1" smtClean="0"/>
-              <a:t>tấn</a:t>
-            </a:r>
-            <a:endParaRPr lang="en-US" dirty="0" smtClean="0"/>
-          </a:p>
-          <a:p>
-            <a:r>
-              <a:rPr lang="en-US" dirty="0" smtClean="0"/>
-              <a:t>Cao </a:t>
-            </a:r>
-            <a:r>
-              <a:rPr lang="en-US" dirty="0" err="1" smtClean="0"/>
-              <a:t>Bằng</a:t>
-            </a:r>
-            <a:r>
-              <a:rPr lang="en-US" dirty="0" smtClean="0"/>
-              <a:t> - TP </a:t>
-            </a:r>
-            <a:r>
-              <a:rPr lang="en-US" dirty="0" err="1" smtClean="0"/>
-              <a:t>Vinh</a:t>
-            </a:r>
-            <a:r>
-              <a:rPr lang="en-US" dirty="0" smtClean="0"/>
-              <a:t>	- TP </a:t>
-            </a:r>
-            <a:r>
-              <a:rPr lang="en-US" dirty="0" err="1" smtClean="0"/>
-              <a:t>Hội</a:t>
-            </a:r>
-            <a:r>
-              <a:rPr lang="en-US" dirty="0" smtClean="0"/>
-              <a:t> An - Khánh </a:t>
-            </a:r>
-            <a:r>
-              <a:rPr lang="en-US" dirty="0" err="1" smtClean="0"/>
-              <a:t>Hòa</a:t>
-            </a:r>
-            <a:endParaRPr lang="en-US" dirty="0" smtClean="0"/>
-          </a:p>
-        </p:txBody>
-      </p:sp>
-      <p:sp>
-        <p:nvSpPr>
-          <p:cNvPr id="33" name="TextBox 32"/>
-          <p:cNvSpPr txBox="1"/>
-          <p:nvPr/>
-        </p:nvSpPr>
-        <p:spPr>
-          <a:xfrm>
-            <a:off x="4893857" y="348890"/>
-            <a:ext cx="2463303" cy="707886"/>
-          </a:xfrm>
-          <a:prstGeom prst="rect">
-            <a:avLst/>
-          </a:prstGeom>
-          <a:noFill/>
-        </p:spPr>
-        <p:txBody>
-          <a:bodyPr wrap="none" rtlCol="0">
-            <a:spAutoFit/>
-          </a:bodyPr>
-          <a:lstStyle/>
-          <a:p>
-            <a:r>
-              <a:rPr lang="en-US" sz="4000" b="1" dirty="0" smtClean="0"/>
-              <a:t>TẠO HÀNG</a:t>
-            </a:r>
-            <a:endParaRPr lang="en-US" sz="4000" b="1" dirty="0"/>
-          </a:p>
-        </p:txBody>
-      </p:sp>
+        </p:grpSpPr>
+        <p:pic>
+          <p:nvPicPr>
+            <p:cNvPr id="29" name="Picture 28"/>
+            <p:cNvPicPr>
+              <a:picLocks noChangeAspect="1"/>
+            </p:cNvPicPr>
+            <p:nvPr/>
+          </p:nvPicPr>
+          <p:blipFill>
+            <a:blip r:embed="rId5">
+              <a:extLst>
+                <a:ext uri="{28A0092B-C50C-407E-A947-70E740481C1C}">
+                  <a14:useLocalDpi xmlns:a14="http://schemas.microsoft.com/office/drawing/2010/main" val="0"/>
+                </a:ext>
+              </a:extLst>
+            </a:blip>
+            <a:stretch>
+              <a:fillRect/>
+            </a:stretch>
+          </p:blipFill>
+          <p:spPr>
+            <a:xfrm>
+              <a:off x="2776718" y="1072046"/>
+              <a:ext cx="914400" cy="914400"/>
+            </a:xfrm>
+            <a:prstGeom prst="rect">
+              <a:avLst/>
+            </a:prstGeom>
+          </p:spPr>
+        </p:pic>
+        <p:sp>
+          <p:nvSpPr>
+            <p:cNvPr id="31" name="TextBox 30"/>
+            <p:cNvSpPr txBox="1"/>
+            <p:nvPr/>
+          </p:nvSpPr>
+          <p:spPr>
+            <a:xfrm>
+              <a:off x="1655413" y="2030868"/>
+              <a:ext cx="4490187" cy="1323439"/>
+            </a:xfrm>
+            <a:prstGeom prst="rect">
+              <a:avLst/>
+            </a:prstGeom>
+            <a:noFill/>
+          </p:spPr>
+          <p:txBody>
+            <a:bodyPr wrap="square" rtlCol="0">
+              <a:spAutoFit/>
+            </a:bodyPr>
+            <a:lstStyle/>
+            <a:p>
+              <a:r>
+                <a:rPr lang="en-US" sz="2000" b="1" dirty="0" smtClean="0">
+                  <a:solidFill>
+                    <a:schemeClr val="tx2"/>
+                  </a:solidFill>
+                </a:rPr>
+                <a:t>Goods Owner: </a:t>
+              </a:r>
+              <a:r>
+                <a:rPr lang="en-US" sz="2000" b="1" dirty="0" err="1" smtClean="0">
+                  <a:solidFill>
+                    <a:schemeClr val="tx2"/>
+                  </a:solidFill>
+                </a:rPr>
+                <a:t>Thắng</a:t>
+              </a:r>
+              <a:endParaRPr lang="en-US" sz="2000" b="1" dirty="0" smtClean="0">
+                <a:solidFill>
+                  <a:schemeClr val="tx2"/>
+                </a:solidFill>
+              </a:endParaRPr>
+            </a:p>
+            <a:p>
+              <a:r>
+                <a:rPr lang="en-US" sz="2000" b="1" dirty="0" smtClean="0">
+                  <a:solidFill>
+                    <a:schemeClr val="tx2"/>
+                  </a:solidFill>
+                </a:rPr>
+                <a:t>Weight: 4 tones</a:t>
+              </a:r>
+            </a:p>
+            <a:p>
+              <a:r>
+                <a:rPr lang="en-US" sz="2000" b="1" dirty="0" err="1" smtClean="0">
+                  <a:solidFill>
+                    <a:schemeClr val="tx2"/>
+                  </a:solidFill>
+                </a:rPr>
+                <a:t>Huế</a:t>
+              </a:r>
+              <a:r>
+                <a:rPr lang="en-US" sz="2000" b="1" dirty="0" smtClean="0">
+                  <a:solidFill>
+                    <a:schemeClr val="tx2"/>
+                  </a:solidFill>
+                </a:rPr>
+                <a:t>, </a:t>
+              </a:r>
+              <a:r>
+                <a:rPr lang="en-US" sz="2000" b="1" dirty="0" err="1" smtClean="0">
+                  <a:solidFill>
+                    <a:schemeClr val="tx2"/>
+                  </a:solidFill>
+                </a:rPr>
+                <a:t>Thừa</a:t>
+              </a:r>
+              <a:r>
+                <a:rPr lang="en-US" sz="2000" b="1" dirty="0" smtClean="0">
+                  <a:solidFill>
+                    <a:schemeClr val="tx2"/>
+                  </a:solidFill>
+                </a:rPr>
+                <a:t> </a:t>
+              </a:r>
+              <a:r>
+                <a:rPr lang="en-US" sz="2000" b="1" dirty="0" err="1" smtClean="0">
+                  <a:solidFill>
+                    <a:schemeClr val="tx2"/>
+                  </a:solidFill>
+                </a:rPr>
+                <a:t>Thiên</a:t>
+              </a:r>
+              <a:r>
+                <a:rPr lang="en-US" sz="2000" b="1" dirty="0" smtClean="0">
+                  <a:solidFill>
+                    <a:schemeClr val="tx2"/>
+                  </a:solidFill>
+                </a:rPr>
+                <a:t> </a:t>
+              </a:r>
+              <a:r>
+                <a:rPr lang="en-US" sz="2000" b="1" dirty="0" err="1" smtClean="0">
+                  <a:solidFill>
+                    <a:schemeClr val="tx2"/>
+                  </a:solidFill>
+                </a:rPr>
+                <a:t>Huế</a:t>
+              </a:r>
+              <a:r>
+                <a:rPr lang="en-US" sz="2000" b="1" dirty="0" smtClean="0">
+                  <a:solidFill>
+                    <a:schemeClr val="tx2"/>
+                  </a:solidFill>
+                </a:rPr>
+                <a:t> - </a:t>
+              </a:r>
+              <a:r>
+                <a:rPr lang="en-US" sz="2000" b="1" dirty="0" smtClean="0">
+                  <a:solidFill>
+                    <a:schemeClr val="tx2"/>
+                  </a:solidFill>
+                </a:rPr>
+                <a:t>Cam </a:t>
+              </a:r>
+              <a:r>
+                <a:rPr lang="en-US" sz="2000" b="1" dirty="0" err="1" smtClean="0">
+                  <a:solidFill>
+                    <a:schemeClr val="tx2"/>
+                  </a:solidFill>
+                </a:rPr>
+                <a:t>Ranh</a:t>
+              </a:r>
+              <a:r>
+                <a:rPr lang="en-US" sz="2000" b="1" dirty="0" smtClean="0">
+                  <a:solidFill>
+                    <a:schemeClr val="tx2"/>
+                  </a:solidFill>
+                </a:rPr>
+                <a:t>, </a:t>
+              </a:r>
+              <a:r>
+                <a:rPr lang="en-US" sz="2000" b="1" dirty="0" err="1" smtClean="0">
+                  <a:solidFill>
+                    <a:schemeClr val="tx2"/>
+                  </a:solidFill>
+                </a:rPr>
+                <a:t>Khánh</a:t>
+              </a:r>
+              <a:r>
+                <a:rPr lang="en-US" sz="2000" b="1" dirty="0" smtClean="0">
+                  <a:solidFill>
+                    <a:schemeClr val="tx2"/>
+                  </a:solidFill>
+                </a:rPr>
+                <a:t> </a:t>
+              </a:r>
+              <a:r>
+                <a:rPr lang="en-US" sz="2000" b="1" dirty="0" err="1" smtClean="0">
+                  <a:solidFill>
+                    <a:schemeClr val="tx2"/>
+                  </a:solidFill>
+                </a:rPr>
+                <a:t>Hòa</a:t>
+              </a:r>
+              <a:endParaRPr lang="en-US" sz="2000" b="1" dirty="0" smtClean="0">
+                <a:solidFill>
+                  <a:schemeClr val="tx2"/>
+                </a:solidFill>
+              </a:endParaRPr>
+            </a:p>
+          </p:txBody>
+        </p:sp>
+        <p:pic>
+          <p:nvPicPr>
+            <p:cNvPr id="34" name="Picture 33"/>
+            <p:cNvPicPr>
+              <a:picLocks noChangeAspect="1"/>
+            </p:cNvPicPr>
+            <p:nvPr/>
+          </p:nvPicPr>
+          <p:blipFill>
+            <a:blip r:embed="rId5">
+              <a:extLst>
+                <a:ext uri="{28A0092B-C50C-407E-A947-70E740481C1C}">
+                  <a14:useLocalDpi xmlns:a14="http://schemas.microsoft.com/office/drawing/2010/main" val="0"/>
+                </a:ext>
+              </a:extLst>
+            </a:blip>
+            <a:stretch>
+              <a:fillRect/>
+            </a:stretch>
+          </p:blipFill>
+          <p:spPr>
+            <a:xfrm>
+              <a:off x="2564463" y="3828496"/>
+              <a:ext cx="914400" cy="914400"/>
+            </a:xfrm>
+            <a:prstGeom prst="rect">
+              <a:avLst/>
+            </a:prstGeom>
+          </p:spPr>
+        </p:pic>
+        <p:sp>
+          <p:nvSpPr>
+            <p:cNvPr id="35" name="TextBox 19"/>
+            <p:cNvSpPr txBox="1"/>
+            <p:nvPr/>
+          </p:nvSpPr>
+          <p:spPr>
+            <a:xfrm>
+              <a:off x="1790049" y="4720970"/>
+              <a:ext cx="3103808" cy="1015663"/>
+            </a:xfrm>
+            <a:prstGeom prst="rect">
+              <a:avLst/>
+            </a:prstGeom>
+            <a:noFill/>
+          </p:spPr>
+          <p:txBody>
+            <a:bodyPr wrap="square" rtlCol="0">
+              <a:spAutoFit/>
+            </a:bodyPr>
+            <a:lstStyle>
+              <a:defPPr>
+                <a:defRPr lang="en-US"/>
+              </a:defPPr>
+              <a:lvl1pPr marL="0" algn="l" defTabSz="914400" rtl="0" eaLnBrk="1" latinLnBrk="0" hangingPunct="1">
+                <a:defRPr sz="1800" kern="1200">
+                  <a:solidFill>
+                    <a:schemeClr val="tx1"/>
+                  </a:solidFill>
+                  <a:latin typeface="+mn-lt"/>
+                  <a:ea typeface="+mn-ea"/>
+                  <a:cs typeface="+mn-cs"/>
+                </a:defRPr>
+              </a:lvl1pPr>
+              <a:lvl2pPr marL="457200" algn="l" defTabSz="914400" rtl="0" eaLnBrk="1" latinLnBrk="0" hangingPunct="1">
+                <a:defRPr sz="1800" kern="1200">
+                  <a:solidFill>
+                    <a:schemeClr val="tx1"/>
+                  </a:solidFill>
+                  <a:latin typeface="+mn-lt"/>
+                  <a:ea typeface="+mn-ea"/>
+                  <a:cs typeface="+mn-cs"/>
+                </a:defRPr>
+              </a:lvl2pPr>
+              <a:lvl3pPr marL="914400" algn="l" defTabSz="914400" rtl="0" eaLnBrk="1" latinLnBrk="0" hangingPunct="1">
+                <a:defRPr sz="1800" kern="1200">
+                  <a:solidFill>
+                    <a:schemeClr val="tx1"/>
+                  </a:solidFill>
+                  <a:latin typeface="+mn-lt"/>
+                  <a:ea typeface="+mn-ea"/>
+                  <a:cs typeface="+mn-cs"/>
+                </a:defRPr>
+              </a:lvl3pPr>
+              <a:lvl4pPr marL="1371600" algn="l" defTabSz="914400" rtl="0" eaLnBrk="1" latinLnBrk="0" hangingPunct="1">
+                <a:defRPr sz="1800" kern="1200">
+                  <a:solidFill>
+                    <a:schemeClr val="tx1"/>
+                  </a:solidFill>
+                  <a:latin typeface="+mn-lt"/>
+                  <a:ea typeface="+mn-ea"/>
+                  <a:cs typeface="+mn-cs"/>
+                </a:defRPr>
+              </a:lvl4pPr>
+              <a:lvl5pPr marL="1828800" algn="l" defTabSz="914400" rtl="0" eaLnBrk="1" latinLnBrk="0" hangingPunct="1">
+                <a:defRPr sz="1800" kern="1200">
+                  <a:solidFill>
+                    <a:schemeClr val="tx1"/>
+                  </a:solidFill>
+                  <a:latin typeface="+mn-lt"/>
+                  <a:ea typeface="+mn-ea"/>
+                  <a:cs typeface="+mn-cs"/>
+                </a:defRPr>
+              </a:lvl5pPr>
+              <a:lvl6pPr marL="2286000" algn="l" defTabSz="914400" rtl="0" eaLnBrk="1" latinLnBrk="0" hangingPunct="1">
+                <a:defRPr sz="1800" kern="1200">
+                  <a:solidFill>
+                    <a:schemeClr val="tx1"/>
+                  </a:solidFill>
+                  <a:latin typeface="+mn-lt"/>
+                  <a:ea typeface="+mn-ea"/>
+                  <a:cs typeface="+mn-cs"/>
+                </a:defRPr>
+              </a:lvl6pPr>
+              <a:lvl7pPr marL="2743200" algn="l" defTabSz="914400" rtl="0" eaLnBrk="1" latinLnBrk="0" hangingPunct="1">
+                <a:defRPr sz="1800" kern="1200">
+                  <a:solidFill>
+                    <a:schemeClr val="tx1"/>
+                  </a:solidFill>
+                  <a:latin typeface="+mn-lt"/>
+                  <a:ea typeface="+mn-ea"/>
+                  <a:cs typeface="+mn-cs"/>
+                </a:defRPr>
+              </a:lvl7pPr>
+              <a:lvl8pPr marL="3200400" algn="l" defTabSz="914400" rtl="0" eaLnBrk="1" latinLnBrk="0" hangingPunct="1">
+                <a:defRPr sz="1800" kern="1200">
+                  <a:solidFill>
+                    <a:schemeClr val="tx1"/>
+                  </a:solidFill>
+                  <a:latin typeface="+mn-lt"/>
+                  <a:ea typeface="+mn-ea"/>
+                  <a:cs typeface="+mn-cs"/>
+                </a:defRPr>
+              </a:lvl8pPr>
+              <a:lvl9pPr marL="3657600" algn="l" defTabSz="914400" rtl="0" eaLnBrk="1" latinLnBrk="0" hangingPunct="1">
+                <a:defRPr sz="1800" kern="1200">
+                  <a:solidFill>
+                    <a:schemeClr val="tx1"/>
+                  </a:solidFill>
+                  <a:latin typeface="+mn-lt"/>
+                  <a:ea typeface="+mn-ea"/>
+                  <a:cs typeface="+mn-cs"/>
+                </a:defRPr>
+              </a:lvl9pPr>
+            </a:lstStyle>
+            <a:p>
+              <a:r>
+                <a:rPr lang="en-US" sz="2000" b="1" dirty="0" smtClean="0">
+                  <a:solidFill>
+                    <a:schemeClr val="tx2"/>
+                  </a:solidFill>
+                </a:rPr>
+                <a:t>Goods </a:t>
+              </a:r>
+              <a:r>
+                <a:rPr lang="en-US" sz="2000" b="1" dirty="0" err="1" smtClean="0">
+                  <a:solidFill>
+                    <a:schemeClr val="tx2"/>
+                  </a:solidFill>
+                </a:rPr>
+                <a:t>Onwer</a:t>
+              </a:r>
+              <a:r>
+                <a:rPr lang="en-US" sz="2000" b="1" dirty="0" smtClean="0">
+                  <a:solidFill>
+                    <a:schemeClr val="tx2"/>
+                  </a:solidFill>
+                </a:rPr>
+                <a:t>: </a:t>
+              </a:r>
+              <a:r>
+                <a:rPr lang="en-US" sz="2000" b="1" dirty="0" err="1" smtClean="0">
+                  <a:solidFill>
+                    <a:schemeClr val="tx2"/>
+                  </a:solidFill>
+                </a:rPr>
+                <a:t>Hoàng</a:t>
+              </a:r>
+              <a:endParaRPr lang="en-US" sz="2000" b="1" dirty="0" smtClean="0">
+                <a:solidFill>
+                  <a:schemeClr val="tx2"/>
+                </a:solidFill>
+              </a:endParaRPr>
+            </a:p>
+            <a:p>
+              <a:r>
+                <a:rPr lang="en-US" sz="2000" b="1" dirty="0" smtClean="0">
+                  <a:solidFill>
+                    <a:schemeClr val="tx2"/>
+                  </a:solidFill>
+                </a:rPr>
+                <a:t>2 </a:t>
+              </a:r>
+              <a:r>
+                <a:rPr lang="en-US" sz="2000" b="1" dirty="0" err="1" smtClean="0">
+                  <a:solidFill>
+                    <a:schemeClr val="tx2"/>
+                  </a:solidFill>
+                </a:rPr>
+                <a:t>tấn</a:t>
+              </a:r>
+              <a:r>
+                <a:rPr lang="en-US" sz="2000" b="1" dirty="0" smtClean="0">
+                  <a:solidFill>
+                    <a:schemeClr val="tx2"/>
+                  </a:solidFill>
+                </a:rPr>
+                <a:t> </a:t>
+              </a:r>
+              <a:r>
+                <a:rPr lang="en-US" sz="2000" b="1" dirty="0" err="1" smtClean="0">
+                  <a:solidFill>
+                    <a:schemeClr val="tx2"/>
+                  </a:solidFill>
+                </a:rPr>
+                <a:t>hàng</a:t>
+              </a:r>
+              <a:r>
+                <a:rPr lang="en-US" sz="2000" b="1" dirty="0" smtClean="0">
+                  <a:solidFill>
+                    <a:schemeClr val="tx2"/>
+                  </a:solidFill>
+                </a:rPr>
+                <a:t> </a:t>
+              </a:r>
+              <a:r>
+                <a:rPr lang="en-US" sz="2000" b="1" dirty="0" err="1" smtClean="0">
+                  <a:solidFill>
+                    <a:schemeClr val="tx2"/>
+                  </a:solidFill>
+                </a:rPr>
+                <a:t>đông</a:t>
+              </a:r>
+              <a:r>
+                <a:rPr lang="en-US" sz="2000" b="1" dirty="0" smtClean="0">
+                  <a:solidFill>
+                    <a:schemeClr val="tx2"/>
+                  </a:solidFill>
+                </a:rPr>
+                <a:t> </a:t>
+              </a:r>
+              <a:r>
+                <a:rPr lang="en-US" sz="2000" b="1" dirty="0" err="1" smtClean="0">
+                  <a:solidFill>
+                    <a:schemeClr val="tx2"/>
+                  </a:solidFill>
+                </a:rPr>
+                <a:t>lạnh</a:t>
+              </a:r>
+              <a:endParaRPr lang="en-US" sz="2000" b="1" dirty="0" smtClean="0">
+                <a:solidFill>
+                  <a:schemeClr val="tx2"/>
+                </a:solidFill>
+              </a:endParaRPr>
+            </a:p>
+            <a:p>
+              <a:r>
+                <a:rPr lang="en-US" sz="2000" b="1" dirty="0" err="1" smtClean="0">
+                  <a:solidFill>
+                    <a:schemeClr val="tx2"/>
+                  </a:solidFill>
+                </a:rPr>
+                <a:t>Hà</a:t>
+              </a:r>
+              <a:r>
+                <a:rPr lang="en-US" sz="2000" b="1" dirty="0" smtClean="0">
+                  <a:solidFill>
+                    <a:schemeClr val="tx2"/>
+                  </a:solidFill>
+                </a:rPr>
+                <a:t> </a:t>
+              </a:r>
+              <a:r>
+                <a:rPr lang="en-US" sz="2000" b="1" dirty="0" err="1" smtClean="0">
+                  <a:solidFill>
+                    <a:schemeClr val="tx2"/>
+                  </a:solidFill>
+                </a:rPr>
+                <a:t>Nội</a:t>
+              </a:r>
+              <a:r>
+                <a:rPr lang="en-US" sz="2000" b="1" dirty="0" smtClean="0">
+                  <a:solidFill>
+                    <a:schemeClr val="tx2"/>
+                  </a:solidFill>
+                </a:rPr>
+                <a:t> – </a:t>
+              </a:r>
+              <a:r>
+                <a:rPr lang="en-US" sz="2000" b="1" dirty="0" err="1" smtClean="0">
+                  <a:solidFill>
+                    <a:schemeClr val="tx2"/>
+                  </a:solidFill>
+                </a:rPr>
+                <a:t>Hồ</a:t>
+              </a:r>
+              <a:r>
+                <a:rPr lang="en-US" sz="2000" b="1" dirty="0" smtClean="0">
+                  <a:solidFill>
+                    <a:schemeClr val="tx2"/>
+                  </a:solidFill>
+                </a:rPr>
+                <a:t> </a:t>
+              </a:r>
+              <a:r>
+                <a:rPr lang="en-US" sz="2000" b="1" dirty="0" err="1" smtClean="0">
+                  <a:solidFill>
+                    <a:schemeClr val="tx2"/>
+                  </a:solidFill>
+                </a:rPr>
+                <a:t>Chí</a:t>
+              </a:r>
+              <a:r>
+                <a:rPr lang="en-US" sz="2000" b="1" dirty="0" smtClean="0">
+                  <a:solidFill>
+                    <a:schemeClr val="tx2"/>
+                  </a:solidFill>
+                </a:rPr>
+                <a:t> Minh</a:t>
+              </a:r>
+            </a:p>
+          </p:txBody>
+        </p:sp>
+      </p:grpSp>
       <p:pic>
         <p:nvPicPr>
-          <p:cNvPr id="34" name="Picture 33"/>
+          <p:cNvPr id="36" name="Picture 35"/>
           <p:cNvPicPr>
             <a:picLocks noChangeAspect="1"/>
           </p:cNvPicPr>
           <p:nvPr/>
         </p:nvPicPr>
         <p:blipFill>
-          <a:blip r:embed="rId4">
+          <a:blip r:embed="rId4" cstate="print">
             <a:extLst>
               <a:ext uri="{28A0092B-C50C-407E-A947-70E740481C1C}">
                 <a14:useLocalDpi xmlns:a14="http://schemas.microsoft.com/office/drawing/2010/main" val="0"/>
@@ -15073,8 +16066,8 @@
         </p:blipFill>
         <p:spPr>
           <a:xfrm>
-            <a:off x="2074572" y="3569416"/>
-            <a:ext cx="914400" cy="914400"/>
+            <a:off x="9203632" y="3798016"/>
+            <a:ext cx="1442434" cy="1327597"/>
           </a:xfrm>
           <a:prstGeom prst="rect">
             <a:avLst/>
@@ -15083,14 +16076,14 @@
       </p:pic>
       <p:sp>
         <p:nvSpPr>
-          <p:cNvPr id="35" name="TextBox 19"/>
+          <p:cNvPr id="37" name="TextBox 7"/>
           <p:cNvSpPr txBox="1"/>
           <p:nvPr/>
         </p:nvSpPr>
         <p:spPr>
           <a:xfrm>
-            <a:off x="979868" y="4852515"/>
-            <a:ext cx="3103808" cy="923330"/>
+            <a:off x="7269481" y="4934330"/>
+            <a:ext cx="4693920" cy="1323439"/>
           </a:xfrm>
           <a:prstGeom prst="rect">
             <a:avLst/>
@@ -15198,409 +16191,339 @@
           </a:lstStyle>
           <a:p>
             <a:r>
-              <a:rPr lang="en-US" dirty="0" err="1" smtClean="0"/>
-              <a:t>Chủ</a:t>
-            </a:r>
-            <a:r>
-              <a:rPr lang="en-US" dirty="0" smtClean="0"/>
-              <a:t> </a:t>
-            </a:r>
-            <a:r>
-              <a:rPr lang="en-US" dirty="0" err="1" smtClean="0"/>
-              <a:t>hàng</a:t>
-            </a:r>
-            <a:r>
-              <a:rPr lang="en-US" dirty="0" smtClean="0"/>
-              <a:t> </a:t>
-            </a:r>
-            <a:r>
-              <a:rPr lang="en-US" dirty="0" err="1" smtClean="0"/>
-              <a:t>Hoàng</a:t>
-            </a:r>
-            <a:endParaRPr lang="en-US" dirty="0" smtClean="0"/>
+              <a:rPr lang="en-US" sz="2000" b="1" dirty="0" smtClean="0">
+                <a:solidFill>
+                  <a:schemeClr val="tx2"/>
+                </a:solidFill>
+              </a:rPr>
+              <a:t>Truck Driver: </a:t>
+            </a:r>
+            <a:r>
+              <a:rPr lang="en-US" sz="2000" b="1" dirty="0" err="1" smtClean="0">
+                <a:solidFill>
+                  <a:schemeClr val="tx2"/>
+                </a:solidFill>
+              </a:rPr>
+              <a:t>Lợi</a:t>
+            </a:r>
+            <a:endParaRPr lang="en-US" sz="2000" b="1" dirty="0" smtClean="0">
+              <a:solidFill>
+                <a:schemeClr val="tx2"/>
+              </a:solidFill>
+            </a:endParaRPr>
           </a:p>
           <a:p>
             <a:r>
-              <a:rPr lang="en-US" dirty="0" smtClean="0"/>
-              <a:t>2 </a:t>
-            </a:r>
-            <a:r>
-              <a:rPr lang="en-US" dirty="0" err="1" smtClean="0"/>
-              <a:t>tấn</a:t>
-            </a:r>
-            <a:r>
-              <a:rPr lang="en-US" dirty="0" smtClean="0"/>
-              <a:t> </a:t>
-            </a:r>
-            <a:r>
-              <a:rPr lang="en-US" dirty="0" err="1" smtClean="0"/>
-              <a:t>hàng</a:t>
-            </a:r>
-            <a:r>
-              <a:rPr lang="en-US" dirty="0" smtClean="0"/>
-              <a:t> </a:t>
-            </a:r>
-            <a:r>
-              <a:rPr lang="en-US" dirty="0" err="1" smtClean="0"/>
-              <a:t>đông</a:t>
-            </a:r>
-            <a:r>
-              <a:rPr lang="en-US" dirty="0" smtClean="0"/>
-              <a:t> </a:t>
-            </a:r>
-            <a:r>
-              <a:rPr lang="en-US" dirty="0" err="1" smtClean="0"/>
-              <a:t>lạnh</a:t>
-            </a:r>
-            <a:endParaRPr lang="en-US" dirty="0" smtClean="0"/>
+              <a:rPr lang="en-US" sz="2000" b="1" dirty="0" smtClean="0">
+                <a:solidFill>
+                  <a:schemeClr val="tx2"/>
+                </a:solidFill>
+              </a:rPr>
+              <a:t>Payload: 10 tones</a:t>
+            </a:r>
+            <a:endParaRPr lang="en-US" sz="2000" b="1" dirty="0" smtClean="0">
+              <a:solidFill>
+                <a:schemeClr val="tx2"/>
+              </a:solidFill>
+            </a:endParaRPr>
           </a:p>
           <a:p>
             <a:r>
-              <a:rPr lang="en-US" dirty="0" err="1" smtClean="0"/>
+              <a:rPr lang="en-US" sz="2000" b="1" dirty="0" err="1" smtClean="0">
+                <a:solidFill>
+                  <a:schemeClr val="tx2"/>
+                </a:solidFill>
+              </a:rPr>
               <a:t>Hà</a:t>
             </a:r>
             <a:r>
-              <a:rPr lang="en-US" dirty="0" smtClean="0"/>
+              <a:rPr lang="en-US" sz="2000" b="1" dirty="0" smtClean="0">
+                <a:solidFill>
+                  <a:schemeClr val="tx2"/>
+                </a:solidFill>
+              </a:rPr>
               <a:t> </a:t>
             </a:r>
             <a:r>
-              <a:rPr lang="en-US" dirty="0" err="1" smtClean="0"/>
-              <a:t>Nội</a:t>
-            </a:r>
-            <a:r>
-              <a:rPr lang="en-US" dirty="0" smtClean="0"/>
+              <a:rPr lang="en-US" sz="2000" b="1" dirty="0" err="1" smtClean="0">
+                <a:solidFill>
+                  <a:schemeClr val="tx2"/>
+                </a:solidFill>
+              </a:rPr>
+              <a:t>Tĩnh</a:t>
+            </a:r>
+            <a:r>
+              <a:rPr lang="en-US" sz="2000" b="1" dirty="0" smtClean="0">
+                <a:solidFill>
+                  <a:schemeClr val="tx2"/>
+                </a:solidFill>
+              </a:rPr>
               <a:t> – </a:t>
             </a:r>
             <a:r>
-              <a:rPr lang="en-US" dirty="0" err="1" smtClean="0"/>
+              <a:rPr lang="en-US" sz="2000" b="1" dirty="0" err="1" smtClean="0">
+                <a:solidFill>
+                  <a:schemeClr val="tx2"/>
+                </a:solidFill>
+              </a:rPr>
+              <a:t>Huế</a:t>
+            </a:r>
+            <a:r>
+              <a:rPr lang="en-US" sz="2000" b="1" dirty="0" smtClean="0">
+                <a:solidFill>
+                  <a:schemeClr val="tx2"/>
+                </a:solidFill>
+              </a:rPr>
+              <a:t> </a:t>
+            </a:r>
+            <a:r>
+              <a:rPr lang="en-US" sz="2000" b="1" dirty="0" smtClean="0">
+                <a:solidFill>
+                  <a:schemeClr val="tx2"/>
+                </a:solidFill>
+              </a:rPr>
+              <a:t>- </a:t>
+            </a:r>
+            <a:r>
+              <a:rPr lang="en-US" sz="2000" b="1" dirty="0" err="1" smtClean="0">
+                <a:solidFill>
+                  <a:schemeClr val="tx2"/>
+                </a:solidFill>
+              </a:rPr>
+              <a:t>Nha</a:t>
+            </a:r>
+            <a:r>
+              <a:rPr lang="en-US" sz="2000" b="1" dirty="0" smtClean="0">
+                <a:solidFill>
+                  <a:schemeClr val="tx2"/>
+                </a:solidFill>
+              </a:rPr>
+              <a:t> </a:t>
+            </a:r>
+            <a:r>
+              <a:rPr lang="en-US" sz="2000" b="1" dirty="0" err="1" smtClean="0">
+                <a:solidFill>
+                  <a:schemeClr val="tx2"/>
+                </a:solidFill>
+              </a:rPr>
+              <a:t>Trang</a:t>
+            </a:r>
+            <a:r>
+              <a:rPr lang="en-US" sz="2000" b="1" dirty="0" smtClean="0">
+                <a:solidFill>
+                  <a:schemeClr val="tx2"/>
+                </a:solidFill>
+              </a:rPr>
+              <a:t> </a:t>
+            </a:r>
+            <a:r>
+              <a:rPr lang="en-US" sz="2000" b="1" dirty="0" smtClean="0">
+                <a:solidFill>
+                  <a:schemeClr val="tx2"/>
+                </a:solidFill>
+              </a:rPr>
+              <a:t>– </a:t>
+            </a:r>
+            <a:r>
+              <a:rPr lang="en-US" sz="2000" b="1" dirty="0" err="1" smtClean="0">
+                <a:solidFill>
+                  <a:schemeClr val="tx2"/>
+                </a:solidFill>
+              </a:rPr>
               <a:t>Hồ</a:t>
             </a:r>
             <a:r>
-              <a:rPr lang="en-US" dirty="0" smtClean="0"/>
+              <a:rPr lang="en-US" sz="2000" b="1" dirty="0" smtClean="0">
+                <a:solidFill>
+                  <a:schemeClr val="tx2"/>
+                </a:solidFill>
+              </a:rPr>
               <a:t> </a:t>
             </a:r>
             <a:r>
-              <a:rPr lang="en-US" dirty="0" err="1" smtClean="0"/>
+              <a:rPr lang="en-US" sz="2000" b="1" dirty="0" err="1" smtClean="0">
+                <a:solidFill>
+                  <a:schemeClr val="tx2"/>
+                </a:solidFill>
+              </a:rPr>
               <a:t>Chí</a:t>
             </a:r>
             <a:r>
-              <a:rPr lang="en-US" dirty="0" smtClean="0"/>
+              <a:rPr lang="en-US" sz="2000" b="1" dirty="0" smtClean="0">
+                <a:solidFill>
+                  <a:schemeClr val="tx2"/>
+                </a:solidFill>
+              </a:rPr>
               <a:t> Minh</a:t>
             </a:r>
+          </a:p>
+          <a:p>
+            <a:r>
+              <a:rPr lang="en-US" sz="2000" b="1" dirty="0" err="1" smtClean="0">
+                <a:solidFill>
+                  <a:schemeClr val="tx2"/>
+                </a:solidFill>
+              </a:rPr>
+              <a:t>Không</a:t>
+            </a:r>
+            <a:r>
+              <a:rPr lang="en-US" sz="2000" b="1" dirty="0" smtClean="0">
+                <a:solidFill>
+                  <a:schemeClr val="tx2"/>
+                </a:solidFill>
+              </a:rPr>
+              <a:t> </a:t>
+            </a:r>
+            <a:r>
+              <a:rPr lang="en-US" sz="2000" b="1" dirty="0" err="1" smtClean="0">
+                <a:solidFill>
+                  <a:schemeClr val="tx2"/>
+                </a:solidFill>
+              </a:rPr>
+              <a:t>chở</a:t>
+            </a:r>
+            <a:r>
+              <a:rPr lang="en-US" sz="2000" b="1" dirty="0" smtClean="0">
+                <a:solidFill>
+                  <a:schemeClr val="tx2"/>
+                </a:solidFill>
+              </a:rPr>
+              <a:t> </a:t>
+            </a:r>
+            <a:r>
+              <a:rPr lang="en-US" sz="2000" b="1" dirty="0" err="1" smtClean="0">
+                <a:solidFill>
+                  <a:schemeClr val="tx2"/>
+                </a:solidFill>
+              </a:rPr>
+              <a:t>hàng</a:t>
+            </a:r>
+            <a:r>
+              <a:rPr lang="en-US" sz="2000" b="1" dirty="0" smtClean="0">
+                <a:solidFill>
+                  <a:schemeClr val="tx2"/>
+                </a:solidFill>
+              </a:rPr>
+              <a:t> </a:t>
+            </a:r>
+            <a:r>
+              <a:rPr lang="en-US" sz="2000" b="1" dirty="0" err="1" smtClean="0">
+                <a:solidFill>
+                  <a:schemeClr val="tx2"/>
+                </a:solidFill>
+              </a:rPr>
+              <a:t>đông</a:t>
+            </a:r>
+            <a:r>
+              <a:rPr lang="en-US" sz="2000" b="1" dirty="0" smtClean="0">
+                <a:solidFill>
+                  <a:schemeClr val="tx2"/>
+                </a:solidFill>
+              </a:rPr>
+              <a:t> </a:t>
+            </a:r>
+            <a:r>
+              <a:rPr lang="en-US" sz="2000" b="1" dirty="0" err="1" smtClean="0">
+                <a:solidFill>
+                  <a:schemeClr val="tx2"/>
+                </a:solidFill>
+              </a:rPr>
+              <a:t>lạnh</a:t>
+            </a:r>
+            <a:r>
+              <a:rPr lang="en-US" sz="2000" b="1" dirty="0" smtClean="0">
+                <a:solidFill>
+                  <a:schemeClr val="tx2"/>
+                </a:solidFill>
+              </a:rPr>
+              <a:t>, </a:t>
+            </a:r>
+            <a:r>
+              <a:rPr lang="en-US" sz="2000" b="1" dirty="0" err="1" smtClean="0">
+                <a:solidFill>
+                  <a:schemeClr val="tx2"/>
+                </a:solidFill>
+              </a:rPr>
+              <a:t>dễ</a:t>
+            </a:r>
+            <a:r>
+              <a:rPr lang="en-US" sz="2000" b="1" dirty="0" smtClean="0">
+                <a:solidFill>
+                  <a:schemeClr val="tx2"/>
+                </a:solidFill>
+              </a:rPr>
+              <a:t> </a:t>
+            </a:r>
+            <a:r>
+              <a:rPr lang="en-US" sz="2000" b="1" dirty="0" err="1" smtClean="0">
+                <a:solidFill>
+                  <a:schemeClr val="tx2"/>
+                </a:solidFill>
+              </a:rPr>
+              <a:t>cháy</a:t>
+            </a:r>
+            <a:r>
+              <a:rPr lang="en-US" sz="2000" b="1" dirty="0" smtClean="0">
+                <a:solidFill>
+                  <a:schemeClr val="tx2"/>
+                </a:solidFill>
+              </a:rPr>
+              <a:t> </a:t>
+            </a:r>
+            <a:r>
+              <a:rPr lang="en-US" sz="2000" b="1" dirty="0" err="1" smtClean="0">
+                <a:solidFill>
+                  <a:schemeClr val="tx2"/>
+                </a:solidFill>
+              </a:rPr>
+              <a:t>nổ</a:t>
+            </a:r>
+            <a:endParaRPr lang="en-US" sz="2000" b="1" dirty="0" smtClean="0">
+              <a:solidFill>
+                <a:schemeClr val="tx2"/>
+              </a:solidFill>
+            </a:endParaRPr>
           </a:p>
         </p:txBody>
       </p:sp>
-      <p:pic>
-        <p:nvPicPr>
-          <p:cNvPr id="36" name="Picture 35"/>
-          <p:cNvPicPr>
-            <a:picLocks noChangeAspect="1"/>
-          </p:cNvPicPr>
-          <p:nvPr/>
-        </p:nvPicPr>
-        <p:blipFill>
-          <a:blip r:embed="rId5" cstate="print">
-            <a:extLst>
-              <a:ext uri="{28A0092B-C50C-407E-A947-70E740481C1C}">
-                <a14:useLocalDpi xmlns:a14="http://schemas.microsoft.com/office/drawing/2010/main" val="0"/>
-              </a:ext>
-            </a:extLst>
-          </a:blip>
-          <a:stretch>
-            <a:fillRect/>
-          </a:stretch>
-        </p:blipFill>
-        <p:spPr>
-          <a:xfrm>
-            <a:off x="8776912" y="3569416"/>
-            <a:ext cx="1442434" cy="1327597"/>
-          </a:xfrm>
-          <a:prstGeom prst="rect">
-            <a:avLst/>
-          </a:prstGeom>
-        </p:spPr>
-      </p:pic>
       <p:sp>
         <p:nvSpPr>
-          <p:cNvPr id="37" name="TextBox 7"/>
-          <p:cNvSpPr txBox="1"/>
-          <p:nvPr/>
+          <p:cNvPr id="13" name="Title 1"/>
+          <p:cNvSpPr>
+            <a:spLocks noGrp="1"/>
+          </p:cNvSpPr>
+          <p:nvPr>
+            <p:ph type="title"/>
+          </p:nvPr>
         </p:nvSpPr>
         <p:spPr>
           <a:xfrm>
-            <a:off x="7489023" y="4720970"/>
-            <a:ext cx="4018209" cy="1477328"/>
+            <a:off x="24398" y="483401"/>
+            <a:ext cx="4578082" cy="817764"/>
           </a:xfrm>
-          <a:prstGeom prst="rect">
-            <a:avLst/>
-          </a:prstGeom>
-          <a:noFill/>
         </p:spPr>
         <p:txBody>
-          <a:bodyPr wrap="square" rtlCol="0">
-            <a:spAutoFit/>
+          <a:bodyPr>
+            <a:normAutofit/>
           </a:bodyPr>
-          <a:lstStyle>
-            <a:defPPr>
-              <a:defRPr lang="en-US"/>
-            </a:defPPr>
-            <a:lvl1pPr marL="0" algn="l" defTabSz="914400" rtl="0" eaLnBrk="1" latinLnBrk="0" hangingPunct="1">
-              <a:defRPr sz="1800" kern="1200">
-                <a:solidFill>
-                  <a:schemeClr val="tx1"/>
-                </a:solidFill>
-                <a:latin typeface="+mn-lt"/>
-                <a:ea typeface="+mn-ea"/>
-                <a:cs typeface="+mn-cs"/>
-              </a:defRPr>
-            </a:lvl1pPr>
-            <a:lvl2pPr marL="457200" algn="l" defTabSz="914400" rtl="0" eaLnBrk="1" latinLnBrk="0" hangingPunct="1">
-              <a:defRPr sz="1800" kern="1200">
-                <a:solidFill>
-                  <a:schemeClr val="tx1"/>
-                </a:solidFill>
-                <a:latin typeface="+mn-lt"/>
-                <a:ea typeface="+mn-ea"/>
-                <a:cs typeface="+mn-cs"/>
-              </a:defRPr>
-            </a:lvl2pPr>
-            <a:lvl3pPr marL="914400" algn="l" defTabSz="914400" rtl="0" eaLnBrk="1" latinLnBrk="0" hangingPunct="1">
-              <a:defRPr sz="1800" kern="1200">
-                <a:solidFill>
-                  <a:schemeClr val="tx1"/>
-                </a:solidFill>
-                <a:latin typeface="+mn-lt"/>
-                <a:ea typeface="+mn-ea"/>
-                <a:cs typeface="+mn-cs"/>
-              </a:defRPr>
-            </a:lvl3pPr>
-            <a:lvl4pPr marL="1371600" algn="l" defTabSz="914400" rtl="0" eaLnBrk="1" latinLnBrk="0" hangingPunct="1">
-              <a:defRPr sz="1800" kern="1200">
-                <a:solidFill>
-                  <a:schemeClr val="tx1"/>
-                </a:solidFill>
-                <a:latin typeface="+mn-lt"/>
-                <a:ea typeface="+mn-ea"/>
-                <a:cs typeface="+mn-cs"/>
-              </a:defRPr>
-            </a:lvl4pPr>
-            <a:lvl5pPr marL="1828800" algn="l" defTabSz="914400" rtl="0" eaLnBrk="1" latinLnBrk="0" hangingPunct="1">
-              <a:defRPr sz="1800" kern="1200">
-                <a:solidFill>
-                  <a:schemeClr val="tx1"/>
-                </a:solidFill>
-                <a:latin typeface="+mn-lt"/>
-                <a:ea typeface="+mn-ea"/>
-                <a:cs typeface="+mn-cs"/>
-              </a:defRPr>
-            </a:lvl5pPr>
-            <a:lvl6pPr marL="2286000" algn="l" defTabSz="914400" rtl="0" eaLnBrk="1" latinLnBrk="0" hangingPunct="1">
-              <a:defRPr sz="1800" kern="1200">
-                <a:solidFill>
-                  <a:schemeClr val="tx1"/>
-                </a:solidFill>
-                <a:latin typeface="+mn-lt"/>
-                <a:ea typeface="+mn-ea"/>
-                <a:cs typeface="+mn-cs"/>
-              </a:defRPr>
-            </a:lvl6pPr>
-            <a:lvl7pPr marL="2743200" algn="l" defTabSz="914400" rtl="0" eaLnBrk="1" latinLnBrk="0" hangingPunct="1">
-              <a:defRPr sz="1800" kern="1200">
-                <a:solidFill>
-                  <a:schemeClr val="tx1"/>
-                </a:solidFill>
-                <a:latin typeface="+mn-lt"/>
-                <a:ea typeface="+mn-ea"/>
-                <a:cs typeface="+mn-cs"/>
-              </a:defRPr>
-            </a:lvl7pPr>
-            <a:lvl8pPr marL="3200400" algn="l" defTabSz="914400" rtl="0" eaLnBrk="1" latinLnBrk="0" hangingPunct="1">
-              <a:defRPr sz="1800" kern="1200">
-                <a:solidFill>
-                  <a:schemeClr val="tx1"/>
-                </a:solidFill>
-                <a:latin typeface="+mn-lt"/>
-                <a:ea typeface="+mn-ea"/>
-                <a:cs typeface="+mn-cs"/>
-              </a:defRPr>
-            </a:lvl8pPr>
-            <a:lvl9pPr marL="3657600" algn="l" defTabSz="914400" rtl="0" eaLnBrk="1" latinLnBrk="0" hangingPunct="1">
-              <a:defRPr sz="1800" kern="1200">
-                <a:solidFill>
-                  <a:schemeClr val="tx1"/>
-                </a:solidFill>
-                <a:latin typeface="+mn-lt"/>
-                <a:ea typeface="+mn-ea"/>
-                <a:cs typeface="+mn-cs"/>
-              </a:defRPr>
-            </a:lvl9pPr>
-          </a:lstStyle>
+          <a:lstStyle/>
           <a:p>
-            <a:r>
-              <a:rPr lang="en-US" dirty="0" err="1" smtClean="0"/>
-              <a:t>Tài</a:t>
-            </a:r>
-            <a:r>
-              <a:rPr lang="en-US" dirty="0" smtClean="0"/>
-              <a:t> </a:t>
-            </a:r>
-            <a:r>
-              <a:rPr lang="en-US" dirty="0" err="1" smtClean="0"/>
-              <a:t>xế</a:t>
-            </a:r>
-            <a:r>
-              <a:rPr lang="en-US" dirty="0" smtClean="0"/>
-              <a:t> </a:t>
-            </a:r>
-            <a:r>
-              <a:rPr lang="en-US" dirty="0" err="1" smtClean="0"/>
-              <a:t>Lợi</a:t>
-            </a:r>
-            <a:endParaRPr lang="en-US" dirty="0" smtClean="0"/>
-          </a:p>
-          <a:p>
-            <a:r>
-              <a:rPr lang="en-US" dirty="0" err="1" smtClean="0"/>
-              <a:t>Xe</a:t>
-            </a:r>
-            <a:r>
-              <a:rPr lang="en-US" dirty="0" smtClean="0"/>
-              <a:t> </a:t>
-            </a:r>
-            <a:r>
-              <a:rPr lang="en-US" dirty="0" err="1" smtClean="0"/>
-              <a:t>tải</a:t>
-            </a:r>
-            <a:r>
-              <a:rPr lang="en-US" dirty="0" smtClean="0"/>
-              <a:t> 8 </a:t>
-            </a:r>
-            <a:r>
-              <a:rPr lang="en-US" dirty="0" err="1" smtClean="0"/>
-              <a:t>tấn</a:t>
-            </a:r>
-            <a:endParaRPr lang="en-US" dirty="0" smtClean="0"/>
-          </a:p>
-          <a:p>
-            <a:r>
-              <a:rPr lang="en-US" dirty="0" err="1" smtClean="0"/>
-              <a:t>Hà</a:t>
-            </a:r>
-            <a:r>
-              <a:rPr lang="en-US" dirty="0" smtClean="0"/>
-              <a:t> </a:t>
-            </a:r>
-            <a:r>
-              <a:rPr lang="en-US" dirty="0" err="1" smtClean="0"/>
-              <a:t>Tĩnh</a:t>
-            </a:r>
-            <a:r>
-              <a:rPr lang="en-US" dirty="0" smtClean="0"/>
-              <a:t> – TP </a:t>
-            </a:r>
-            <a:r>
-              <a:rPr lang="en-US" dirty="0" err="1" smtClean="0"/>
-              <a:t>Huế</a:t>
-            </a:r>
-            <a:r>
-              <a:rPr lang="en-US" dirty="0" smtClean="0"/>
-              <a:t> - TP </a:t>
-            </a:r>
-            <a:r>
-              <a:rPr lang="en-US" dirty="0" err="1" smtClean="0"/>
-              <a:t>Nha</a:t>
-            </a:r>
-            <a:r>
-              <a:rPr lang="en-US" dirty="0" smtClean="0"/>
-              <a:t> </a:t>
-            </a:r>
-            <a:r>
-              <a:rPr lang="en-US" dirty="0" err="1" smtClean="0"/>
-              <a:t>Trang</a:t>
-            </a:r>
-            <a:r>
-              <a:rPr lang="en-US" dirty="0" smtClean="0"/>
-              <a:t> – </a:t>
-            </a:r>
-            <a:r>
-              <a:rPr lang="en-US" dirty="0" err="1" smtClean="0"/>
-              <a:t>Hồ</a:t>
-            </a:r>
-            <a:r>
-              <a:rPr lang="en-US" dirty="0" smtClean="0"/>
-              <a:t> </a:t>
-            </a:r>
-            <a:r>
-              <a:rPr lang="en-US" dirty="0" err="1" smtClean="0"/>
-              <a:t>Chí</a:t>
-            </a:r>
-            <a:r>
-              <a:rPr lang="en-US" dirty="0" smtClean="0"/>
-              <a:t> Minh</a:t>
-            </a:r>
-          </a:p>
-          <a:p>
-            <a:r>
-              <a:rPr lang="en-US" dirty="0" err="1" smtClean="0"/>
-              <a:t>Không</a:t>
-            </a:r>
-            <a:r>
-              <a:rPr lang="en-US" dirty="0" smtClean="0"/>
-              <a:t> </a:t>
-            </a:r>
-            <a:r>
-              <a:rPr lang="en-US" dirty="0" err="1" smtClean="0"/>
-              <a:t>chở</a:t>
-            </a:r>
-            <a:r>
-              <a:rPr lang="en-US" dirty="0" smtClean="0"/>
-              <a:t> </a:t>
-            </a:r>
-            <a:r>
-              <a:rPr lang="en-US" dirty="0" err="1" smtClean="0"/>
-              <a:t>hàng</a:t>
-            </a:r>
-            <a:r>
-              <a:rPr lang="en-US" dirty="0" smtClean="0"/>
-              <a:t> </a:t>
-            </a:r>
-            <a:r>
-              <a:rPr lang="en-US" dirty="0" err="1" smtClean="0"/>
-              <a:t>đông</a:t>
-            </a:r>
-            <a:r>
-              <a:rPr lang="en-US" dirty="0" smtClean="0"/>
-              <a:t> </a:t>
-            </a:r>
-            <a:r>
-              <a:rPr lang="en-US" dirty="0" err="1" smtClean="0"/>
-              <a:t>lạnh</a:t>
-            </a:r>
-            <a:r>
-              <a:rPr lang="en-US" dirty="0" smtClean="0"/>
-              <a:t>, </a:t>
-            </a:r>
-            <a:r>
-              <a:rPr lang="en-US" dirty="0" err="1" smtClean="0"/>
-              <a:t>dễ</a:t>
-            </a:r>
-            <a:r>
-              <a:rPr lang="en-US" dirty="0" smtClean="0"/>
-              <a:t> </a:t>
-            </a:r>
-            <a:r>
-              <a:rPr lang="en-US" dirty="0" err="1" smtClean="0"/>
-              <a:t>cháy</a:t>
-            </a:r>
-            <a:r>
-              <a:rPr lang="en-US" dirty="0" smtClean="0"/>
-              <a:t> </a:t>
-            </a:r>
-            <a:r>
-              <a:rPr lang="en-US" dirty="0" err="1" smtClean="0"/>
-              <a:t>nổ</a:t>
-            </a:r>
-            <a:endParaRPr lang="en-US" dirty="0" smtClean="0"/>
+            <a:pPr algn="ctr"/>
+            <a:r>
+              <a:rPr lang="en-US" b="1" dirty="0" smtClean="0">
+                <a:solidFill>
+                  <a:schemeClr val="tx2"/>
+                </a:solidFill>
+                <a:latin typeface="Berlin Sans FB Demi" panose="020E0802020502020306" pitchFamily="34" charset="0"/>
+              </a:rPr>
+              <a:t>DEMO</a:t>
+            </a:r>
+            <a:endParaRPr lang="en-US" sz="4000" b="1" dirty="0">
+              <a:solidFill>
+                <a:schemeClr val="tx2"/>
+              </a:solidFill>
+              <a:latin typeface="Berlin Sans FB Demi" panose="020E0802020502020306" pitchFamily="34" charset="0"/>
+            </a:endParaRPr>
           </a:p>
         </p:txBody>
       </p:sp>
@@ -15656,41 +16579,6 @@
           <a:chExt cx="0" cy="0"/>
         </a:xfrm>
       </p:grpSpPr>
-      <p:sp>
-        <p:nvSpPr>
-          <p:cNvPr id="2" name="Title 1"/>
-          <p:cNvSpPr>
-            <a:spLocks noGrp="1"/>
-          </p:cNvSpPr>
-          <p:nvPr>
-            <p:ph type="title"/>
-          </p:nvPr>
-        </p:nvSpPr>
-        <p:spPr>
-          <a:xfrm>
-            <a:off x="722289" y="171941"/>
-            <a:ext cx="10515600" cy="1325563"/>
-          </a:xfrm>
-        </p:spPr>
-        <p:txBody>
-          <a:bodyPr>
-            <a:normAutofit/>
-          </a:bodyPr>
-          <a:lstStyle/>
-          <a:p>
-            <a:pPr algn="ctr"/>
-            <a:r>
-              <a:rPr lang="en-US" sz="4000" b="1" smtClean="0">
-                <a:latin typeface="+mn-lt"/>
-              </a:rPr>
-              <a:t>THUẬT TOÁN MATCHING</a:t>
-            </a:r>
-            <a:endParaRPr lang="en-US" sz="4000" b="1">
-              <a:latin typeface="+mn-lt"/>
-            </a:endParaRPr>
-          </a:p>
-        </p:txBody>
-      </p:sp>
       <p:pic>
         <p:nvPicPr>
           <p:cNvPr id="4" name="Picture 3"/>
@@ -15713,7 +16601,7 @@
         </p:blipFill>
         <p:spPr>
           <a:xfrm>
-            <a:off x="4362127" y="1282103"/>
+            <a:off x="2731447" y="1301165"/>
             <a:ext cx="3235924" cy="5195970"/>
           </a:xfrm>
           <a:prstGeom prst="rect">
@@ -15721,6 +16609,123 @@
           </a:prstGeom>
         </p:spPr>
       </p:pic>
+      <p:sp>
+        <p:nvSpPr>
+          <p:cNvPr id="5" name="Title 1"/>
+          <p:cNvSpPr txBox="1">
+            <a:spLocks/>
+          </p:cNvSpPr>
+          <p:nvPr/>
+        </p:nvSpPr>
+        <p:spPr>
+          <a:xfrm>
+            <a:off x="786398" y="483401"/>
+            <a:ext cx="4578082" cy="817764"/>
+          </a:xfrm>
+          <a:prstGeom prst="rect">
+            <a:avLst/>
+          </a:prstGeom>
+          <a:effectLst/>
+        </p:spPr>
+        <p:txBody>
+          <a:bodyPr vert="horz" lIns="91440" tIns="45720" rIns="91440" bIns="45720" rtlCol="0" anchor="ctr">
+            <a:normAutofit/>
+          </a:bodyPr>
+          <a:lstStyle>
+            <a:lvl1pPr algn="ctr" defTabSz="457200" rtl="0" eaLnBrk="1" latinLnBrk="0" hangingPunct="1">
+              <a:spcBef>
+                <a:spcPct val="0"/>
+              </a:spcBef>
+              <a:buNone/>
+              <a:defRPr sz="4000" kern="1200" cap="none">
+                <a:ln w="3175" cmpd="sng">
+                  <a:noFill/>
+                </a:ln>
+                <a:solidFill>
+                  <a:schemeClr val="tx1"/>
+                </a:solidFill>
+                <a:effectLst/>
+                <a:latin typeface="+mj-lt"/>
+                <a:ea typeface="+mj-ea"/>
+                <a:cs typeface="+mj-cs"/>
+              </a:defRPr>
+            </a:lvl1pPr>
+            <a:lvl2pPr eaLnBrk="1" hangingPunct="1">
+              <a:defRPr>
+                <a:solidFill>
+                  <a:schemeClr val="tx2"/>
+                </a:solidFill>
+              </a:defRPr>
+            </a:lvl2pPr>
+            <a:lvl3pPr eaLnBrk="1" hangingPunct="1">
+              <a:defRPr>
+                <a:solidFill>
+                  <a:schemeClr val="tx2"/>
+                </a:solidFill>
+              </a:defRPr>
+            </a:lvl3pPr>
+            <a:lvl4pPr eaLnBrk="1" hangingPunct="1">
+              <a:defRPr>
+                <a:solidFill>
+                  <a:schemeClr val="tx2"/>
+                </a:solidFill>
+              </a:defRPr>
+            </a:lvl4pPr>
+            <a:lvl5pPr eaLnBrk="1" hangingPunct="1">
+              <a:defRPr>
+                <a:solidFill>
+                  <a:schemeClr val="tx2"/>
+                </a:solidFill>
+              </a:defRPr>
+            </a:lvl5pPr>
+            <a:lvl6pPr eaLnBrk="1" hangingPunct="1">
+              <a:defRPr>
+                <a:solidFill>
+                  <a:schemeClr val="tx2"/>
+                </a:solidFill>
+              </a:defRPr>
+            </a:lvl6pPr>
+            <a:lvl7pPr eaLnBrk="1" hangingPunct="1">
+              <a:defRPr>
+                <a:solidFill>
+                  <a:schemeClr val="tx2"/>
+                </a:solidFill>
+              </a:defRPr>
+            </a:lvl7pPr>
+            <a:lvl8pPr eaLnBrk="1" hangingPunct="1">
+              <a:defRPr>
+                <a:solidFill>
+                  <a:schemeClr val="tx2"/>
+                </a:solidFill>
+              </a:defRPr>
+            </a:lvl8pPr>
+            <a:lvl9pPr eaLnBrk="1" hangingPunct="1">
+              <a:defRPr>
+                <a:solidFill>
+                  <a:schemeClr val="tx2"/>
+                </a:solidFill>
+              </a:defRPr>
+            </a:lvl9pPr>
+          </a:lstStyle>
+          <a:p>
+            <a:r>
+              <a:rPr lang="en-US" b="1" dirty="0" smtClean="0">
+                <a:solidFill>
+                  <a:schemeClr val="tx2"/>
+                </a:solidFill>
+                <a:latin typeface="Berlin Sans FB Demi" panose="020E0802020502020306" pitchFamily="34" charset="0"/>
+              </a:rPr>
+              <a:t>MATCHING</a:t>
+            </a:r>
+            <a:endParaRPr lang="en-US" b="1" dirty="0">
+              <a:solidFill>
+                <a:schemeClr val="tx2"/>
+              </a:solidFill>
+              <a:latin typeface="Berlin Sans FB Demi" panose="020E0802020502020306" pitchFamily="34" charset="0"/>
+            </a:endParaRPr>
+          </a:p>
+        </p:txBody>
+      </p:sp>
     </p:spTree>
     <p:extLst>
       <p:ext uri="{BB962C8B-B14F-4D97-AF65-F5344CB8AC3E}">
@@ -15795,7 +16800,7 @@
         </p:blipFill>
         <p:spPr>
           <a:xfrm>
-            <a:off x="2074572" y="1072046"/>
+            <a:off x="2516532" y="1102526"/>
             <a:ext cx="914400" cy="914400"/>
           </a:xfrm>
           <a:prstGeom prst="rect">
@@ -15825,7 +16830,7 @@
         </p:blipFill>
         <p:spPr>
           <a:xfrm>
-            <a:off x="8776912" y="865447"/>
+            <a:off x="9416992" y="804487"/>
             <a:ext cx="1442434" cy="1327597"/>
           </a:xfrm>
           <a:prstGeom prst="rect">
@@ -15841,8 +16846,8 @@
         </p:nvSpPr>
         <p:spPr>
           <a:xfrm>
-            <a:off x="979868" y="2000388"/>
-            <a:ext cx="3103808" cy="1200329"/>
+            <a:off x="1421828" y="2030868"/>
+            <a:ext cx="4491292" cy="923330"/>
           </a:xfrm>
           <a:prstGeom prst="rect">
             <a:avLst/>
@@ -16001,7 +17006,7 @@
               </a:rPr>
               <a:t>sứ</a:t>
             </a:r>
-            <a:endParaRPr lang="en-US" dirty="0" smtClean="0">
+            <a:endParaRPr lang="en-US" dirty="0">
               <a:solidFill>
                 <a:prstClr val="black"/>
               </a:solidFill>
@@ -16009,14 +17014,6 @@
           </a:p>
           <a:p>
             <a:r>
-              <a:rPr lang="en-US" dirty="0" smtClean="0">
-                <a:solidFill>
-                  <a:prstClr val="black"/>
-                </a:solidFill>
-              </a:rPr>
-              <a:t>TP </a:t>
-            </a:r>
-            <a:r>
               <a:rPr lang="en-US" dirty="0" err="1" smtClean="0">
                 <a:solidFill>
                   <a:prstClr val="black"/>
@@ -16078,7 +17075,15 @@
                   <a:prstClr val="black"/>
                 </a:solidFill>
               </a:rPr>
-              <a:t> - TP Cam </a:t>
+              <a:t> </a:t>
+            </a:r>
+            <a:r>
+              <a:rPr lang="en-US" dirty="0" smtClean="0">
+                <a:solidFill>
+                  <a:prstClr val="black"/>
+                </a:solidFill>
+              </a:rPr>
+              <a:t>- Cam </a:t>
             </a:r>
             <a:r>
               <a:rPr lang="en-US" dirty="0" err="1" smtClean="0">
@@ -16102,7 +17107,7 @@
                   <a:prstClr val="black"/>
                 </a:solidFill>
               </a:rPr>
-              <a:t>tỉnh</a:t>
+              <a:t>Khánh</a:t>
             </a:r>
             <a:r>
               <a:rPr lang="en-US" dirty="0" smtClean="0">
@@ -16110,7 +17115,7 @@
                   <a:prstClr val="black"/>
                 </a:solidFill>
               </a:rPr>
-              <a:t> Khánh </a:t>
+              <a:t> </a:t>
             </a:r>
             <a:r>
               <a:rPr lang="en-US" dirty="0" err="1" smtClean="0">
@@ -16136,8 +17141,8 @@
         </p:nvSpPr>
         <p:spPr>
           <a:xfrm>
-            <a:off x="7489024" y="2193044"/>
-            <a:ext cx="4018209" cy="1200329"/>
+            <a:off x="8129104" y="2132084"/>
+            <a:ext cx="4018209" cy="923330"/>
           </a:xfrm>
           <a:prstGeom prst="rect">
             <a:avLst/>
@@ -16266,7 +17271,15 @@
                   <a:prstClr val="black"/>
                 </a:solidFill>
               </a:rPr>
-              <a:t> - TP </a:t>
+              <a:t> </a:t>
+            </a:r>
+            <a:r>
+              <a:rPr lang="en-US" dirty="0" smtClean="0">
+                <a:solidFill>
+                  <a:prstClr val="black"/>
+                </a:solidFill>
+              </a:rPr>
+              <a:t>– </a:t>
             </a:r>
             <a:r>
               <a:rPr lang="en-US" dirty="0" err="1" smtClean="0">
@@ -16277,12 +17290,20 @@
               <a:t>Vinh</a:t>
             </a:r>
             <a:r>
+              <a:rPr lang="en-US" dirty="0">
+                <a:solidFill>
+                  <a:prstClr val="black"/>
+                </a:solidFill>
+              </a:rPr>
+              <a:t> </a:t>
+            </a:r>
+            <a:r>
               <a:rPr lang="en-US" dirty="0" smtClean="0">
                 <a:solidFill>
                   <a:prstClr val="black"/>
                 </a:solidFill>
               </a:rPr>
-              <a:t>	- TP </a:t>
+              <a:t>- </a:t>
             </a:r>
             <a:r>
               <a:rPr lang="en-US" dirty="0" err="1" smtClean="0">
@@ -16298,7 +17319,15 @@
                   <a:prstClr val="black"/>
                 </a:solidFill>
               </a:rPr>
-              <a:t> An - Khánh </a:t>
+              <a:t> </a:t>
+            </a:r>
+            <a:r>
+              <a:rPr lang="en-US" dirty="0" smtClean="0">
+                <a:solidFill>
+                  <a:prstClr val="black"/>
+                </a:solidFill>
+              </a:rPr>
+              <a:t>An - Khánh </a:t>
             </a:r>
             <a:r>
               <a:rPr lang="en-US" dirty="0" err="1" smtClean="0">
@@ -16309,44 +17338,6 @@
               <a:t>Hòa</a:t>
             </a:r>
             <a:endParaRPr lang="en-US" dirty="0" smtClean="0">
-              <a:solidFill>
-                <a:prstClr val="black"/>
-              </a:solidFill>
-            </a:endParaRPr>
-          </a:p>
-        </p:txBody>
-      </p:sp>
-      <p:sp>
-        <p:nvSpPr>
-          <p:cNvPr id="10" name="TextBox 9"/>
-          <p:cNvSpPr txBox="1"/>
-          <p:nvPr/>
-        </p:nvSpPr>
-        <p:spPr>
-          <a:xfrm>
-            <a:off x="4072918" y="345665"/>
-            <a:ext cx="3861955" cy="707886"/>
-          </a:xfrm>
-          <a:prstGeom prst="rect">
-            <a:avLst/>
-          </a:prstGeom>
-          <a:noFill/>
-        </p:spPr>
-        <p:txBody>
-          <a:bodyPr wrap="none" rtlCol="0">
-            <a:spAutoFit/>
-          </a:bodyPr>
-          <a:lstStyle/>
-          <a:p>
-            <a:r>
-              <a:rPr lang="en-US" sz="4000" b="1" dirty="0" smtClean="0">
-                <a:solidFill>
-                  <a:prstClr val="black"/>
-                </a:solidFill>
-              </a:rPr>
-              <a:t>TRẢ GIÁ ĐỀ NGHỊ</a:t>
-            </a:r>
-            <a:endParaRPr lang="en-US" sz="4000" b="1" dirty="0">
               <a:solidFill>
                 <a:prstClr val="black"/>
               </a:solidFill>
@@ -16376,7 +17367,7 @@
         </p:blipFill>
         <p:spPr>
           <a:xfrm>
-            <a:off x="2074572" y="4439813"/>
+            <a:off x="2806092" y="4317893"/>
             <a:ext cx="914400" cy="914400"/>
           </a:xfrm>
           <a:prstGeom prst="rect">
@@ -16392,7 +17383,7 @@
         </p:nvSpPr>
         <p:spPr>
           <a:xfrm>
-            <a:off x="979868" y="5485818"/>
+            <a:off x="1711388" y="5211498"/>
             <a:ext cx="3103808" cy="923330"/>
           </a:xfrm>
           <a:prstGeom prst="rect">
@@ -16707,7 +17698,7 @@
         </p:blipFill>
         <p:spPr>
           <a:xfrm>
-            <a:off x="8788855" y="3881222"/>
+            <a:off x="9428935" y="3820262"/>
             <a:ext cx="1442434" cy="1327597"/>
           </a:xfrm>
           <a:prstGeom prst="rect">
@@ -16723,8 +17714,8 @@
         </p:nvSpPr>
         <p:spPr>
           <a:xfrm>
-            <a:off x="7568870" y="5208819"/>
-            <a:ext cx="4018209" cy="1477328"/>
+            <a:off x="8208950" y="5147859"/>
+            <a:ext cx="4018209" cy="1200329"/>
           </a:xfrm>
           <a:prstGeom prst="rect">
             <a:avLst/>
@@ -16955,7 +17946,7 @@
                   <a:prstClr val="black"/>
                 </a:solidFill>
               </a:rPr>
-              <a:t> – TP </a:t>
+              <a:t> – </a:t>
             </a:r>
             <a:r>
               <a:rPr lang="en-US" dirty="0" err="1" smtClean="0">
@@ -16971,7 +17962,15 @@
                   <a:prstClr val="black"/>
                 </a:solidFill>
               </a:rPr>
-              <a:t> - TP </a:t>
+              <a:t> </a:t>
+            </a:r>
+            <a:r>
+              <a:rPr lang="en-US" dirty="0" smtClean="0">
+                <a:solidFill>
+                  <a:prstClr val="black"/>
+                </a:solidFill>
+              </a:rPr>
+              <a:t>- </a:t>
             </a:r>
             <a:r>
               <a:rPr lang="en-US" dirty="0" err="1" smtClean="0">
@@ -17175,7 +18174,7 @@
         </p:nvSpPr>
         <p:spPr>
           <a:xfrm>
-            <a:off x="4476634" y="1685687"/>
+            <a:off x="5116714" y="1624727"/>
             <a:ext cx="2616200" cy="600164"/>
           </a:xfrm>
           <a:prstGeom prst="rightArrow">
@@ -17262,7 +18261,7 @@
         </p:nvSpPr>
         <p:spPr>
           <a:xfrm>
-            <a:off x="4454395" y="5676237"/>
+            <a:off x="5094475" y="5615277"/>
             <a:ext cx="2616200" cy="542492"/>
           </a:xfrm>
           <a:prstGeom prst="leftArrow">
@@ -17349,7 +18348,7 @@
         </p:nvSpPr>
         <p:spPr>
           <a:xfrm rot="1475434">
-            <a:off x="4466425" y="3401144"/>
+            <a:off x="5106505" y="3340184"/>
             <a:ext cx="2616200" cy="628014"/>
           </a:xfrm>
           <a:prstGeom prst="rightArrow">
@@ -17436,7 +18435,7 @@
         </p:nvSpPr>
         <p:spPr>
           <a:xfrm rot="1481275">
-            <a:off x="4476634" y="3702673"/>
+            <a:off x="5116714" y="3641713"/>
             <a:ext cx="2616200" cy="679011"/>
           </a:xfrm>
           <a:prstGeom prst="leftArrow">
@@ -17539,7 +18538,7 @@
         </p:nvSpPr>
         <p:spPr>
           <a:xfrm>
-            <a:off x="5249957" y="5413758"/>
+            <a:off x="5890037" y="5352798"/>
             <a:ext cx="987315" cy="1038886"/>
           </a:xfrm>
           <a:prstGeom prst="noSmoking">
@@ -17588,7 +18587,7 @@
         </p:nvSpPr>
         <p:spPr>
           <a:xfrm>
-            <a:off x="5077680" y="1435600"/>
+            <a:off x="5717760" y="1374640"/>
             <a:ext cx="987315" cy="1038886"/>
           </a:xfrm>
           <a:prstGeom prst="noSmoking">
@@ -17637,7 +18636,7 @@
         </p:nvSpPr>
         <p:spPr>
           <a:xfrm rot="1475434">
-            <a:off x="4580813" y="3781229"/>
+            <a:off x="5220893" y="3720269"/>
             <a:ext cx="2616200" cy="628014"/>
           </a:xfrm>
           <a:prstGeom prst="rightArrow">
@@ -17740,7 +18739,7 @@
         </p:nvSpPr>
         <p:spPr>
           <a:xfrm rot="19928568">
-            <a:off x="3235980" y="3499800"/>
+            <a:off x="3876060" y="3438840"/>
             <a:ext cx="4320691" cy="542492"/>
           </a:xfrm>
           <a:prstGeom prst="leftArrow">
@@ -17831,6 +18830,123 @@
               <a:solidFill>
                 <a:prstClr val="black"/>
               </a:solidFill>
+            </a:endParaRPr>
+          </a:p>
+        </p:txBody>
+      </p:sp>
+      <p:sp>
+        <p:nvSpPr>
+          <p:cNvPr id="22" name="Title 1"/>
+          <p:cNvSpPr txBox="1">
+            <a:spLocks/>
+          </p:cNvSpPr>
+          <p:nvPr/>
+        </p:nvSpPr>
+        <p:spPr>
+          <a:xfrm>
+            <a:off x="786398" y="483401"/>
+            <a:ext cx="4578082" cy="817764"/>
+          </a:xfrm>
+          <a:prstGeom prst="rect">
+            <a:avLst/>
+          </a:prstGeom>
+          <a:effectLst/>
+        </p:spPr>
+        <p:txBody>
+          <a:bodyPr vert="horz" lIns="91440" tIns="45720" rIns="91440" bIns="45720" rtlCol="0" anchor="ctr">
+            <a:normAutofit/>
+          </a:bodyPr>
+          <a:lstStyle>
+            <a:lvl1pPr algn="ctr" defTabSz="457200" rtl="0" eaLnBrk="1" latinLnBrk="0" hangingPunct="1">
+              <a:spcBef>
+                <a:spcPct val="0"/>
+              </a:spcBef>
+              <a:buNone/>
+              <a:defRPr sz="4000" kern="1200" cap="none">
+                <a:ln w="3175" cmpd="sng">
+                  <a:noFill/>
+                </a:ln>
+                <a:solidFill>
+                  <a:schemeClr val="tx1"/>
+                </a:solidFill>
+                <a:effectLst/>
+                <a:latin typeface="+mj-lt"/>
+                <a:ea typeface="+mj-ea"/>
+                <a:cs typeface="+mj-cs"/>
+              </a:defRPr>
+            </a:lvl1pPr>
+            <a:lvl2pPr eaLnBrk="1" hangingPunct="1">
+              <a:defRPr>
+                <a:solidFill>
+                  <a:schemeClr val="tx2"/>
+                </a:solidFill>
+              </a:defRPr>
+            </a:lvl2pPr>
+            <a:lvl3pPr eaLnBrk="1" hangingPunct="1">
+              <a:defRPr>
+                <a:solidFill>
+                  <a:schemeClr val="tx2"/>
+                </a:solidFill>
+              </a:defRPr>
+            </a:lvl3pPr>
+            <a:lvl4pPr eaLnBrk="1" hangingPunct="1">
+              <a:defRPr>
+                <a:solidFill>
+                  <a:schemeClr val="tx2"/>
+                </a:solidFill>
+              </a:defRPr>
+            </a:lvl4pPr>
+            <a:lvl5pPr eaLnBrk="1" hangingPunct="1">
+              <a:defRPr>
+                <a:solidFill>
+                  <a:schemeClr val="tx2"/>
+                </a:solidFill>
+              </a:defRPr>
+            </a:lvl5pPr>
+            <a:lvl6pPr eaLnBrk="1" hangingPunct="1">
+              <a:defRPr>
+                <a:solidFill>
+                  <a:schemeClr val="tx2"/>
+                </a:solidFill>
+              </a:defRPr>
+            </a:lvl6pPr>
+            <a:lvl7pPr eaLnBrk="1" hangingPunct="1">
+              <a:defRPr>
+                <a:solidFill>
+                  <a:schemeClr val="tx2"/>
+                </a:solidFill>
+              </a:defRPr>
+            </a:lvl7pPr>
+            <a:lvl8pPr eaLnBrk="1" hangingPunct="1">
+              <a:defRPr>
+                <a:solidFill>
+                  <a:schemeClr val="tx2"/>
+                </a:solidFill>
+              </a:defRPr>
+            </a:lvl8pPr>
+            <a:lvl9pPr eaLnBrk="1" hangingPunct="1">
+              <a:defRPr>
+                <a:solidFill>
+                  <a:schemeClr val="tx2"/>
+                </a:solidFill>
+              </a:defRPr>
+            </a:lvl9pPr>
+          </a:lstStyle>
+          <a:p>
+            <a:r>
+              <a:rPr lang="en-US" b="1" dirty="0" smtClean="0">
+                <a:solidFill>
+                  <a:schemeClr val="tx2"/>
+                </a:solidFill>
+                <a:latin typeface="Berlin Sans FB Demi" panose="020E0802020502020306" pitchFamily="34" charset="0"/>
+              </a:rPr>
+              <a:t>MAKE DEAL</a:t>
+            </a:r>
+            <a:endParaRPr lang="en-US" b="1" dirty="0">
+              <a:solidFill>
+                <a:schemeClr val="tx2"/>
+              </a:solidFill>
+              <a:latin typeface="Berlin Sans FB Demi" panose="020E0802020502020306" pitchFamily="34" charset="0"/>
             </a:endParaRPr>
           </a:p>
         </p:txBody>
@@ -18482,41 +19598,6 @@
           <a:chExt cx="0" cy="0"/>
         </a:xfrm>
       </p:grpSpPr>
-      <p:sp>
-        <p:nvSpPr>
-          <p:cNvPr id="4" name="Title 1"/>
-          <p:cNvSpPr>
-            <a:spLocks noGrp="1"/>
-          </p:cNvSpPr>
-          <p:nvPr>
-            <p:ph type="title"/>
-          </p:nvPr>
-        </p:nvSpPr>
-        <p:spPr>
-          <a:xfrm>
-            <a:off x="801843" y="1034826"/>
-            <a:ext cx="10515600" cy="1325563"/>
-          </a:xfrm>
-        </p:spPr>
-        <p:txBody>
-          <a:bodyPr>
-            <a:normAutofit/>
-          </a:bodyPr>
-          <a:lstStyle/>
-          <a:p>
-            <a:pPr algn="ctr"/>
-            <a:r>
-              <a:rPr lang="en-US" sz="4000" b="1" smtClean="0">
-                <a:latin typeface="+mn-lt"/>
-              </a:rPr>
-              <a:t>TRẠNG THÁI HÓA ĐƠN</a:t>
-            </a:r>
-            <a:endParaRPr lang="en-US" sz="4000" b="1">
-              <a:latin typeface="+mn-lt"/>
-            </a:endParaRPr>
-          </a:p>
-        </p:txBody>
-      </p:sp>
       <p:pic>
         <p:nvPicPr>
           <p:cNvPr id="2" name="Picture 1"/>
@@ -18565,6 +19646,123 @@
           </a:prstGeom>
         </p:spPr>
       </p:pic>
+      <p:sp>
+        <p:nvSpPr>
+          <p:cNvPr id="6" name="Title 1"/>
+          <p:cNvSpPr txBox="1">
+            <a:spLocks/>
+          </p:cNvSpPr>
+          <p:nvPr/>
+        </p:nvSpPr>
+        <p:spPr>
+          <a:xfrm>
+            <a:off x="1030238" y="483401"/>
+            <a:ext cx="4578082" cy="817764"/>
+          </a:xfrm>
+          <a:prstGeom prst="rect">
+            <a:avLst/>
+          </a:prstGeom>
+          <a:effectLst/>
+        </p:spPr>
+        <p:txBody>
+          <a:bodyPr vert="horz" lIns="91440" tIns="45720" rIns="91440" bIns="45720" rtlCol="0" anchor="ctr">
+            <a:normAutofit/>
+          </a:bodyPr>
+          <a:lstStyle>
+            <a:lvl1pPr algn="ctr" defTabSz="457200" rtl="0" eaLnBrk="1" latinLnBrk="0" hangingPunct="1">
+              <a:spcBef>
+                <a:spcPct val="0"/>
+              </a:spcBef>
+              <a:buNone/>
+              <a:defRPr sz="4000" kern="1200" cap="none">
+                <a:ln w="3175" cmpd="sng">
+                  <a:noFill/>
+                </a:ln>
+                <a:solidFill>
+                  <a:schemeClr val="tx1"/>
+                </a:solidFill>
+                <a:effectLst/>
+                <a:latin typeface="+mj-lt"/>
+                <a:ea typeface="+mj-ea"/>
+                <a:cs typeface="+mj-cs"/>
+              </a:defRPr>
+            </a:lvl1pPr>
+            <a:lvl2pPr eaLnBrk="1" hangingPunct="1">
+              <a:defRPr>
+                <a:solidFill>
+                  <a:schemeClr val="tx2"/>
+                </a:solidFill>
+              </a:defRPr>
+            </a:lvl2pPr>
+            <a:lvl3pPr eaLnBrk="1" hangingPunct="1">
+              <a:defRPr>
+                <a:solidFill>
+                  <a:schemeClr val="tx2"/>
+                </a:solidFill>
+              </a:defRPr>
+            </a:lvl3pPr>
+            <a:lvl4pPr eaLnBrk="1" hangingPunct="1">
+              <a:defRPr>
+                <a:solidFill>
+                  <a:schemeClr val="tx2"/>
+                </a:solidFill>
+              </a:defRPr>
+            </a:lvl4pPr>
+            <a:lvl5pPr eaLnBrk="1" hangingPunct="1">
+              <a:defRPr>
+                <a:solidFill>
+                  <a:schemeClr val="tx2"/>
+                </a:solidFill>
+              </a:defRPr>
+            </a:lvl5pPr>
+            <a:lvl6pPr eaLnBrk="1" hangingPunct="1">
+              <a:defRPr>
+                <a:solidFill>
+                  <a:schemeClr val="tx2"/>
+                </a:solidFill>
+              </a:defRPr>
+            </a:lvl6pPr>
+            <a:lvl7pPr eaLnBrk="1" hangingPunct="1">
+              <a:defRPr>
+                <a:solidFill>
+                  <a:schemeClr val="tx2"/>
+                </a:solidFill>
+              </a:defRPr>
+            </a:lvl7pPr>
+            <a:lvl8pPr eaLnBrk="1" hangingPunct="1">
+              <a:defRPr>
+                <a:solidFill>
+                  <a:schemeClr val="tx2"/>
+                </a:solidFill>
+              </a:defRPr>
+            </a:lvl8pPr>
+            <a:lvl9pPr eaLnBrk="1" hangingPunct="1">
+              <a:defRPr>
+                <a:solidFill>
+                  <a:schemeClr val="tx2"/>
+                </a:solidFill>
+              </a:defRPr>
+            </a:lvl9pPr>
+          </a:lstStyle>
+          <a:p>
+            <a:r>
+              <a:rPr lang="en-US" b="1" dirty="0" smtClean="0">
+                <a:solidFill>
+                  <a:schemeClr val="tx2"/>
+                </a:solidFill>
+                <a:latin typeface="Berlin Sans FB Demi" panose="020E0802020502020306" pitchFamily="34" charset="0"/>
+              </a:rPr>
+              <a:t>ORDER STATUS</a:t>
+            </a:r>
+            <a:endParaRPr lang="en-US" b="1" dirty="0">
+              <a:solidFill>
+                <a:schemeClr val="tx2"/>
+              </a:solidFill>
+              <a:latin typeface="Berlin Sans FB Demi" panose="020E0802020502020306" pitchFamily="34" charset="0"/>
+            </a:endParaRPr>
+          </a:p>
+        </p:txBody>
+      </p:sp>
     </p:spTree>
     <p:extLst>
       <p:ext uri="{BB962C8B-B14F-4D97-AF65-F5344CB8AC3E}">
@@ -19263,8 +20461,8 @@
         </p:nvSpPr>
         <p:spPr>
           <a:xfrm>
-            <a:off x="838200" y="236336"/>
-            <a:ext cx="10515600" cy="1325563"/>
+            <a:off x="1441718" y="483401"/>
+            <a:ext cx="4578082" cy="817764"/>
           </a:xfrm>
         </p:spPr>
         <p:txBody>
@@ -19275,81 +20473,27 @@
           <a:p>
             <a:pPr algn="ctr"/>
             <a:r>
-              <a:rPr lang="en-US" sz="4000" b="1" dirty="0" smtClean="0">
-                <a:latin typeface="+mn-lt"/>
+              <a:rPr lang="en-US" b="1" dirty="0" smtClean="0">
+                <a:solidFill>
+                  <a:schemeClr val="tx2"/>
+                </a:solidFill>
+                <a:latin typeface="Berlin Sans FB Demi" panose="020E0802020502020306" pitchFamily="34" charset="0"/>
               </a:rPr>
-              <a:t>VẤN ĐỀ</a:t>
+              <a:t>DISADVANTAGES</a:t>
             </a:r>
             <a:endParaRPr lang="en-US" sz="4000" b="1" dirty="0">
-              <a:latin typeface="+mn-lt"/>
+              <a:solidFill>
+                <a:schemeClr val="tx2"/>
+              </a:solidFill>
+              <a:latin typeface="Berlin Sans FB Demi" panose="020E0802020502020306" pitchFamily="34" charset="0"/>
             </a:endParaRPr>
           </a:p>
         </p:txBody>
       </p:sp>
-      <p:pic>
-        <p:nvPicPr>
-          <p:cNvPr id="5" name="Picture 4"/>
-          <p:cNvPicPr>
-            <a:picLocks noChangeAspect="1"/>
-          </p:cNvPicPr>
-          <p:nvPr/>
-        </p:nvPicPr>
-        <p:blipFill>
-          <a:blip r:embed="rId3" cstate="print">
-            <a:extLst>
-              <a:ext uri="{28A0092B-C50C-407E-A947-70E740481C1C}">
-                <a14:useLocalDpi xmlns:a14="http://schemas.microsoft.com/office/drawing/2010/main" val="0"/>
-              </a:ext>
-            </a:extLst>
-          </a:blip>
-          <a:stretch>
-            <a:fillRect/>
-          </a:stretch>
-        </p:blipFill>
-        <p:spPr>
-          <a:xfrm>
-            <a:off x="3528812" y="1561898"/>
-            <a:ext cx="5164428" cy="4753271"/>
-          </a:xfrm>
-          <a:prstGeom prst="rect">
-            <a:avLst/>
-          </a:prstGeom>
-        </p:spPr>
-      </p:pic>
-      <p:pic>
-        <p:nvPicPr>
-          <p:cNvPr id="6" name="Picture 5"/>
-          <p:cNvPicPr>
-            <a:picLocks noChangeAspect="1"/>
-          </p:cNvPicPr>
-          <p:nvPr/>
-        </p:nvPicPr>
-        <p:blipFill>
-          <a:blip r:embed="rId4">
-            <a:extLst>
-              <a:ext uri="{28A0092B-C50C-407E-A947-70E740481C1C}">
-                <a14:useLocalDpi xmlns:a14="http://schemas.microsoft.com/office/drawing/2010/main" val="0"/>
-              </a:ext>
-            </a:extLst>
-          </a:blip>
-          <a:stretch>
-            <a:fillRect/>
-          </a:stretch>
-        </p:blipFill>
-        <p:spPr>
-          <a:xfrm>
-            <a:off x="4057918" y="2180085"/>
-            <a:ext cx="2438400" cy="2438400"/>
-          </a:xfrm>
-          <a:prstGeom prst="rect">
-            <a:avLst/>
-          </a:prstGeom>
-        </p:spPr>
-      </p:pic>
     </p:spTree>
     <p:extLst>
       <p:ext uri="{BB962C8B-B14F-4D97-AF65-F5344CB8AC3E}">
-        <p14:creationId xmlns:p14="http://schemas.microsoft.com/office/powerpoint/2010/main" val="1575882208"/>
+        <p14:creationId xmlns:p14="http://schemas.microsoft.com/office/powerpoint/2010/main" val="4288164113"/>
       </p:ext>
     </p:extLst>
   </p:cSld>
@@ -19359,75 +20503,7 @@
   <p:timing>
     <p:tnLst>
       <p:par>
-        <p:cTn id="1" dur="indefinite" restart="never" nodeType="tmRoot">
-          <p:childTnLst>
-            <p:seq concurrent="1" nextAc="seek">
-              <p:cTn id="2" dur="indefinite" nodeType="mainSeq">
-                <p:childTnLst>
-                  <p:par>
-                    <p:cTn id="3" fill="hold">
-                      <p:stCondLst>
-                        <p:cond delay="indefinite"/>
-                      </p:stCondLst>
-                      <p:childTnLst>
-                        <p:par>
-                          <p:cTn id="4" fill="hold">
-                            <p:stCondLst>
-                              <p:cond delay="0"/>
-                            </p:stCondLst>
-                            <p:childTnLst>
-                              <p:par>
-                                <p:cTn id="5" presetID="1" presetClass="entr" presetSubtype="0" fill="hold" nodeType="clickEffect">
-                                  <p:stCondLst>
-                                    <p:cond delay="0"/>
-                                  </p:stCondLst>
-                                  <p:childTnLst>
-                                    <p:set>
-                                      <p:cBhvr>
-                                        <p:cTn id="6" dur="1" fill="hold">
-                                          <p:stCondLst>
-                                            <p:cond delay="0"/>
-                                          </p:stCondLst>
-                                        </p:cTn>
-                                        <p:tgtEl>
-                                          <p:spTgt spid="6"/>
-                                        </p:tgtEl>
-                                        <p:attrNameLst>
-                                          <p:attrName>style.visibility</p:attrName>
-                                        </p:attrNameLst>
-                                      </p:cBhvr>
-                                      <p:to>
-                                        <p:strVal val="visible"/>
-                                      </p:to>
-                                    </p:set>
-                                  </p:childTnLst>
-                                </p:cTn>
-                              </p:par>
-                            </p:childTnLst>
-                          </p:cTn>
-                        </p:par>
-                      </p:childTnLst>
-                    </p:cTn>
-                  </p:par>
-                </p:childTnLst>
-              </p:cTn>
-              <p:prevCondLst>
-                <p:cond evt="onPrev" delay="0">
-                  <p:tgtEl>
-                    <p:sldTgt/>
-                  </p:tgtEl>
-                </p:cond>
-              </p:prevCondLst>
-              <p:nextCondLst>
-                <p:cond evt="onNext" delay="0">
-                  <p:tgtEl>
-                    <p:sldTgt/>
-                  </p:tgtEl>
-                </p:cond>
-              </p:nextCondLst>
-            </p:seq>
-          </p:childTnLst>
-        </p:cTn>
+        <p:cTn id="1" dur="indefinite" restart="never" nodeType="tmRoot"/>
       </p:par>
     </p:tnLst>
   </p:timing>
@@ -19440,7 +20516,7 @@
     <p:bg>
       <p:bgPr>
         <a:blipFill dpi="0" rotWithShape="1">
-          <a:blip r:embed="rId2">
+          <a:blip r:embed="rId3">
             <a:alphaModFix amt="5000"/>
             <a:lum/>
           </a:blip>
@@ -19478,8 +20554,8 @@
         </p:nvSpPr>
         <p:spPr>
           <a:xfrm>
-            <a:off x="838200" y="236336"/>
-            <a:ext cx="10515600" cy="1325563"/>
+            <a:off x="1441718" y="483401"/>
+            <a:ext cx="4578082" cy="817764"/>
           </a:xfrm>
         </p:spPr>
         <p:txBody>
@@ -19490,81 +20566,290 @@
           <a:p>
             <a:pPr algn="ctr"/>
             <a:r>
-              <a:rPr lang="en-US" sz="4000" b="1" smtClean="0">
-                <a:latin typeface="+mn-lt"/>
+              <a:rPr lang="en-US" b="1" dirty="0" smtClean="0">
+                <a:solidFill>
+                  <a:schemeClr val="tx2"/>
+                </a:solidFill>
+                <a:latin typeface="Berlin Sans FB Demi" panose="020E0802020502020306" pitchFamily="34" charset="0"/>
               </a:rPr>
-              <a:t>VẤN ĐỀ</a:t>
-            </a:r>
-            <a:endParaRPr lang="en-US" sz="4000" b="1">
-              <a:latin typeface="+mn-lt"/>
+              <a:t>OUR SOLUTION</a:t>
+            </a:r>
+            <a:endParaRPr lang="en-US" sz="4000" b="1" dirty="0">
+              <a:solidFill>
+                <a:schemeClr val="tx2"/>
+              </a:solidFill>
+              <a:latin typeface="Berlin Sans FB Demi" panose="020E0802020502020306" pitchFamily="34" charset="0"/>
             </a:endParaRPr>
           </a:p>
         </p:txBody>
       </p:sp>
-      <p:pic>
-        <p:nvPicPr>
-          <p:cNvPr id="3" name="Picture 2"/>
-          <p:cNvPicPr>
-            <a:picLocks noChangeAspect="1"/>
-          </p:cNvPicPr>
+      <p:sp>
+        <p:nvSpPr>
+          <p:cNvPr id="3" name="Rectangle 2"/>
+          <p:cNvSpPr/>
           <p:nvPr/>
-        </p:nvPicPr>
-        <p:blipFill>
-          <a:blip r:embed="rId3">
-            <a:extLst>
-              <a:ext uri="{28A0092B-C50C-407E-A947-70E740481C1C}">
-                <a14:useLocalDpi xmlns:a14="http://schemas.microsoft.com/office/drawing/2010/main" val="0"/>
-              </a:ext>
-            </a:extLst>
-          </a:blip>
-          <a:stretch>
-            <a:fillRect/>
-          </a:stretch>
-        </p:blipFill>
+        </p:nvSpPr>
         <p:spPr>
           <a:xfrm>
-            <a:off x="2977092" y="2449672"/>
-            <a:ext cx="3971429" cy="2190476"/>
+            <a:off x="3048000" y="2828836"/>
+            <a:ext cx="6096000" cy="1200329"/>
           </a:xfrm>
           <a:prstGeom prst="rect">
             <a:avLst/>
           </a:prstGeom>
         </p:spPr>
-      </p:pic>
-      <p:pic>
-        <p:nvPicPr>
-          <p:cNvPr id="4" name="Picture 3"/>
-          <p:cNvPicPr>
-            <a:picLocks noChangeAspect="1"/>
-          </p:cNvPicPr>
-          <p:nvPr/>
-        </p:nvPicPr>
-        <p:blipFill>
-          <a:blip r:embed="rId4" cstate="print">
-            <a:extLst>
-              <a:ext uri="{28A0092B-C50C-407E-A947-70E740481C1C}">
-                <a14:useLocalDpi xmlns:a14="http://schemas.microsoft.com/office/drawing/2010/main" val="0"/>
-              </a:ext>
-            </a:extLst>
-          </a:blip>
-          <a:stretch>
-            <a:fillRect/>
-          </a:stretch>
-        </p:blipFill>
-        <p:spPr>
-          <a:xfrm>
-            <a:off x="6948521" y="2449672"/>
-            <a:ext cx="1509142" cy="1906073"/>
-          </a:xfrm>
-          <a:prstGeom prst="rect">
-            <a:avLst/>
-          </a:prstGeom>
-        </p:spPr>
-      </p:pic>
+        <p:txBody>
+          <a:bodyPr>
+            <a:spAutoFit/>
+          </a:bodyPr>
+          <a:lstStyle/>
+          <a:p>
+            <a:pPr marL="457200" indent="-457200">
+              <a:buFontTx/>
+              <a:buChar char="-"/>
+            </a:pPr>
+            <a:r>
+              <a:rPr lang="en-US" dirty="0" err="1" smtClean="0"/>
+              <a:t>Tự</a:t>
+            </a:r>
+            <a:r>
+              <a:rPr lang="en-US" dirty="0" smtClean="0"/>
+              <a:t> </a:t>
+            </a:r>
+            <a:r>
+              <a:rPr lang="en-US" dirty="0" err="1" smtClean="0"/>
+              <a:t>động</a:t>
+            </a:r>
+            <a:r>
+              <a:rPr lang="en-US" dirty="0" smtClean="0"/>
+              <a:t> </a:t>
+            </a:r>
+            <a:r>
+              <a:rPr lang="en-US" dirty="0" err="1" smtClean="0"/>
+              <a:t>tìm</a:t>
+            </a:r>
+            <a:r>
+              <a:rPr lang="en-US" dirty="0" smtClean="0"/>
+              <a:t> </a:t>
+            </a:r>
+            <a:r>
+              <a:rPr lang="en-US" dirty="0" err="1" smtClean="0"/>
+              <a:t>kiếm</a:t>
+            </a:r>
+            <a:r>
+              <a:rPr lang="en-US" dirty="0" smtClean="0"/>
+              <a:t> </a:t>
+            </a:r>
+            <a:r>
+              <a:rPr lang="en-US" dirty="0" err="1" smtClean="0"/>
+              <a:t>tài</a:t>
+            </a:r>
+            <a:r>
+              <a:rPr lang="en-US" dirty="0" smtClean="0"/>
+              <a:t> </a:t>
+            </a:r>
+            <a:r>
+              <a:rPr lang="en-US" dirty="0" err="1" smtClean="0"/>
+              <a:t>xế</a:t>
+            </a:r>
+            <a:r>
+              <a:rPr lang="en-US" dirty="0" smtClean="0"/>
+              <a:t>/ </a:t>
+            </a:r>
+            <a:r>
+              <a:rPr lang="en-US" dirty="0" err="1" smtClean="0"/>
+              <a:t>chủ</a:t>
+            </a:r>
+            <a:r>
+              <a:rPr lang="en-US" dirty="0" smtClean="0"/>
+              <a:t> </a:t>
+            </a:r>
+            <a:r>
+              <a:rPr lang="en-US" dirty="0" err="1" smtClean="0"/>
+              <a:t>hàng</a:t>
+            </a:r>
+            <a:r>
+              <a:rPr lang="en-US" dirty="0" smtClean="0"/>
+              <a:t> </a:t>
+            </a:r>
+            <a:r>
+              <a:rPr lang="en-US" dirty="0" err="1" smtClean="0"/>
+              <a:t>phù</a:t>
+            </a:r>
+            <a:r>
+              <a:rPr lang="en-US" dirty="0" smtClean="0"/>
+              <a:t> </a:t>
+            </a:r>
+            <a:r>
+              <a:rPr lang="en-US" dirty="0" err="1" smtClean="0"/>
+              <a:t>hợp</a:t>
+            </a:r>
+            <a:r>
+              <a:rPr lang="en-US" dirty="0" smtClean="0"/>
+              <a:t> </a:t>
+            </a:r>
+            <a:r>
+              <a:rPr lang="en-US" dirty="0" err="1" smtClean="0"/>
+              <a:t>dựa</a:t>
+            </a:r>
+            <a:r>
+              <a:rPr lang="en-US" dirty="0" smtClean="0"/>
+              <a:t> </a:t>
+            </a:r>
+            <a:r>
+              <a:rPr lang="en-US" dirty="0" err="1" smtClean="0"/>
+              <a:t>trên</a:t>
+            </a:r>
+            <a:r>
+              <a:rPr lang="en-US" dirty="0" smtClean="0"/>
+              <a:t> </a:t>
+            </a:r>
+            <a:r>
+              <a:rPr lang="en-US" dirty="0" err="1" smtClean="0"/>
+              <a:t>các</a:t>
+            </a:r>
+            <a:r>
+              <a:rPr lang="en-US" dirty="0" smtClean="0"/>
+              <a:t> </a:t>
+            </a:r>
+            <a:r>
+              <a:rPr lang="en-US" dirty="0" err="1" smtClean="0"/>
+              <a:t>tiêu</a:t>
+            </a:r>
+            <a:r>
+              <a:rPr lang="en-US" dirty="0" smtClean="0"/>
+              <a:t> </a:t>
+            </a:r>
+            <a:r>
+              <a:rPr lang="en-US" dirty="0" err="1" smtClean="0"/>
+              <a:t>chí</a:t>
+            </a:r>
+            <a:r>
+              <a:rPr lang="en-US" dirty="0" smtClean="0"/>
+              <a:t> </a:t>
+            </a:r>
+            <a:r>
+              <a:rPr lang="en-US" dirty="0" err="1" smtClean="0"/>
+              <a:t>có</a:t>
+            </a:r>
+            <a:r>
+              <a:rPr lang="en-US" dirty="0" smtClean="0"/>
+              <a:t> </a:t>
+            </a:r>
+            <a:r>
+              <a:rPr lang="en-US" dirty="0" err="1" smtClean="0"/>
+              <a:t>sẵn</a:t>
+            </a:r>
+            <a:endParaRPr lang="en-US" dirty="0" smtClean="0"/>
+          </a:p>
+          <a:p>
+            <a:pPr marL="457200" indent="-457200">
+              <a:buFontTx/>
+              <a:buChar char="-"/>
+            </a:pPr>
+            <a:r>
+              <a:rPr lang="en-US" dirty="0" err="1" smtClean="0"/>
+              <a:t>Thực</a:t>
+            </a:r>
+            <a:r>
+              <a:rPr lang="en-US" dirty="0" smtClean="0"/>
+              <a:t> </a:t>
+            </a:r>
+            <a:r>
+              <a:rPr lang="en-US" dirty="0" err="1" smtClean="0"/>
+              <a:t>hiện</a:t>
+            </a:r>
+            <a:r>
+              <a:rPr lang="en-US" dirty="0" smtClean="0"/>
+              <a:t> </a:t>
+            </a:r>
+            <a:r>
+              <a:rPr lang="en-US" dirty="0" err="1" smtClean="0"/>
+              <a:t>thỏa</a:t>
+            </a:r>
+            <a:r>
+              <a:rPr lang="en-US" dirty="0" smtClean="0"/>
+              <a:t> </a:t>
+            </a:r>
+            <a:r>
+              <a:rPr lang="en-US" dirty="0" err="1" smtClean="0"/>
+              <a:t>thuận</a:t>
+            </a:r>
+            <a:r>
+              <a:rPr lang="en-US" dirty="0" smtClean="0"/>
+              <a:t> </a:t>
+            </a:r>
+            <a:r>
+              <a:rPr lang="en-US" dirty="0" err="1" smtClean="0"/>
+              <a:t>trực</a:t>
+            </a:r>
+            <a:r>
+              <a:rPr lang="en-US" dirty="0" smtClean="0"/>
+              <a:t> </a:t>
+            </a:r>
+            <a:r>
+              <a:rPr lang="en-US" dirty="0" err="1" smtClean="0"/>
+              <a:t>tiếp</a:t>
+            </a:r>
+            <a:endParaRPr lang="en-US" dirty="0" smtClean="0"/>
+          </a:p>
+          <a:p>
+            <a:pPr marL="457200" indent="-457200">
+              <a:buFontTx/>
+              <a:buChar char="-"/>
+            </a:pPr>
+            <a:r>
+              <a:rPr lang="en-US" dirty="0" err="1" smtClean="0"/>
+              <a:t>Thực</a:t>
+            </a:r>
+            <a:r>
+              <a:rPr lang="en-US" dirty="0" smtClean="0"/>
+              <a:t> </a:t>
+            </a:r>
+            <a:r>
+              <a:rPr lang="en-US" dirty="0" err="1" smtClean="0"/>
+              <a:t>hiện</a:t>
+            </a:r>
+            <a:r>
+              <a:rPr lang="en-US" dirty="0" smtClean="0"/>
+              <a:t> chia </a:t>
+            </a:r>
+            <a:r>
+              <a:rPr lang="en-US" dirty="0" err="1" smtClean="0"/>
+              <a:t>trả</a:t>
+            </a:r>
+            <a:r>
+              <a:rPr lang="en-US" dirty="0" smtClean="0"/>
+              <a:t> </a:t>
+            </a:r>
+            <a:r>
+              <a:rPr lang="en-US" dirty="0" err="1" smtClean="0"/>
+              <a:t>thông</a:t>
+            </a:r>
+            <a:r>
+              <a:rPr lang="en-US" dirty="0" smtClean="0"/>
+              <a:t> qua </a:t>
+            </a:r>
+            <a:r>
+              <a:rPr lang="en-US" dirty="0" err="1" smtClean="0"/>
+              <a:t>hệ</a:t>
+            </a:r>
+            <a:r>
+              <a:rPr lang="en-US" dirty="0" smtClean="0"/>
+              <a:t> </a:t>
+            </a:r>
+            <a:r>
+              <a:rPr lang="en-US" dirty="0" err="1" smtClean="0"/>
+              <a:t>thống</a:t>
+            </a:r>
+            <a:endParaRPr lang="en-US" dirty="0"/>
+          </a:p>
+        </p:txBody>
+      </p:sp>
     </p:spTree>
     <p:extLst>
       <p:ext uri="{BB962C8B-B14F-4D97-AF65-F5344CB8AC3E}">
-        <p14:creationId xmlns:p14="http://schemas.microsoft.com/office/powerpoint/2010/main" val="2410978210"/>
+        <p14:creationId xmlns:p14="http://schemas.microsoft.com/office/powerpoint/2010/main" val="356655402"/>
       </p:ext>
     </p:extLst>
   </p:cSld>
@@ -19615,129 +20900,121 @@
       </p:grpSpPr>
       <p:sp>
         <p:nvSpPr>
-          <p:cNvPr id="2" name="Title 1"/>
-          <p:cNvSpPr>
-            <a:spLocks noGrp="1"/>
+          <p:cNvPr id="7" name="Title 1"/>
+          <p:cNvSpPr txBox="1">
+            <a:spLocks/>
           </p:cNvSpPr>
-          <p:nvPr>
-            <p:ph type="title"/>
-          </p:nvPr>
+          <p:nvPr/>
         </p:nvSpPr>
         <p:spPr>
           <a:xfrm>
-            <a:off x="838200" y="236336"/>
-            <a:ext cx="10515600" cy="1325563"/>
+            <a:off x="1441718" y="483401"/>
+            <a:ext cx="4578082" cy="817764"/>
           </a:xfrm>
+          <a:prstGeom prst="rect">
+            <a:avLst/>
+          </a:prstGeom>
+          <a:effectLst/>
         </p:spPr>
         <p:txBody>
-          <a:bodyPr>
+          <a:bodyPr vert="horz" lIns="91440" tIns="45720" rIns="91440" bIns="45720" rtlCol="0" anchor="ctr">
             <a:normAutofit/>
           </a:bodyPr>
-          <a:lstStyle/>
+          <a:lstStyle>
+            <a:lvl1pPr algn="ctr" defTabSz="457200" rtl="0" eaLnBrk="1" latinLnBrk="0" hangingPunct="1">
+              <a:spcBef>
+                <a:spcPct val="0"/>
+              </a:spcBef>
+              <a:buNone/>
+              <a:defRPr sz="4000" kern="1200" cap="none">
+                <a:ln w="3175" cmpd="sng">
+                  <a:noFill/>
+                </a:ln>
+                <a:solidFill>
+                  <a:schemeClr val="tx1"/>
+                </a:solidFill>
+                <a:effectLst/>
+                <a:latin typeface="+mj-lt"/>
+                <a:ea typeface="+mj-ea"/>
+                <a:cs typeface="+mj-cs"/>
+              </a:defRPr>
+            </a:lvl1pPr>
+            <a:lvl2pPr eaLnBrk="1" hangingPunct="1">
+              <a:defRPr>
+                <a:solidFill>
+                  <a:schemeClr val="tx2"/>
+                </a:solidFill>
+              </a:defRPr>
+            </a:lvl2pPr>
+            <a:lvl3pPr eaLnBrk="1" hangingPunct="1">
+              <a:defRPr>
+                <a:solidFill>
+                  <a:schemeClr val="tx2"/>
+                </a:solidFill>
+              </a:defRPr>
+            </a:lvl3pPr>
+            <a:lvl4pPr eaLnBrk="1" hangingPunct="1">
+              <a:defRPr>
+                <a:solidFill>
+                  <a:schemeClr val="tx2"/>
+                </a:solidFill>
+              </a:defRPr>
+            </a:lvl4pPr>
+            <a:lvl5pPr eaLnBrk="1" hangingPunct="1">
+              <a:defRPr>
+                <a:solidFill>
+                  <a:schemeClr val="tx2"/>
+                </a:solidFill>
+              </a:defRPr>
+            </a:lvl5pPr>
+            <a:lvl6pPr eaLnBrk="1" hangingPunct="1">
+              <a:defRPr>
+                <a:solidFill>
+                  <a:schemeClr val="tx2"/>
+                </a:solidFill>
+              </a:defRPr>
+            </a:lvl6pPr>
+            <a:lvl7pPr eaLnBrk="1" hangingPunct="1">
+              <a:defRPr>
+                <a:solidFill>
+                  <a:schemeClr val="tx2"/>
+                </a:solidFill>
+              </a:defRPr>
+            </a:lvl7pPr>
+            <a:lvl8pPr eaLnBrk="1" hangingPunct="1">
+              <a:defRPr>
+                <a:solidFill>
+                  <a:schemeClr val="tx2"/>
+                </a:solidFill>
+              </a:defRPr>
+            </a:lvl8pPr>
+            <a:lvl9pPr eaLnBrk="1" hangingPunct="1">
+              <a:defRPr>
+                <a:solidFill>
+                  <a:schemeClr val="tx2"/>
+                </a:solidFill>
+              </a:defRPr>
+            </a:lvl9pPr>
+          </a:lstStyle>
           <a:p>
-            <a:pPr algn="ctr"/>
-            <a:r>
-              <a:rPr lang="en-US" sz="4000" b="1" smtClean="0">
-                <a:latin typeface="+mn-lt"/>
+            <a:r>
+              <a:rPr lang="en-US" b="1" smtClean="0">
+                <a:solidFill>
+                  <a:schemeClr val="tx2"/>
+                </a:solidFill>
+                <a:latin typeface="Berlin Sans FB Demi" panose="020E0802020502020306" pitchFamily="34" charset="0"/>
               </a:rPr>
-              <a:t>GIẢI PHÁP</a:t>
-            </a:r>
-            <a:endParaRPr lang="en-US" sz="4000" b="1">
-              <a:latin typeface="+mn-lt"/>
+              <a:t>OUR SOLUTION</a:t>
+            </a:r>
+            <a:endParaRPr lang="en-US" b="1" dirty="0">
+              <a:solidFill>
+                <a:schemeClr val="tx2"/>
+              </a:solidFill>
+              <a:latin typeface="Berlin Sans FB Demi" panose="020E0802020502020306" pitchFamily="34" charset="0"/>
             </a:endParaRPr>
           </a:p>
         </p:txBody>
       </p:sp>
-      <p:pic>
-        <p:nvPicPr>
-          <p:cNvPr id="3" name="Picture 2"/>
-          <p:cNvPicPr>
-            <a:picLocks noChangeAspect="1"/>
-          </p:cNvPicPr>
-          <p:nvPr/>
-        </p:nvPicPr>
-        <p:blipFill>
-          <a:blip r:embed="rId3">
-            <a:extLst>
-              <a:ext uri="{28A0092B-C50C-407E-A947-70E740481C1C}">
-                <a14:useLocalDpi xmlns:a14="http://schemas.microsoft.com/office/drawing/2010/main" val="0"/>
-              </a:ext>
-            </a:extLst>
-          </a:blip>
-          <a:stretch>
-            <a:fillRect/>
-          </a:stretch>
-        </p:blipFill>
-        <p:spPr>
-          <a:xfrm>
-            <a:off x="7594876" y="2794714"/>
-            <a:ext cx="1991553" cy="1098458"/>
-          </a:xfrm>
-          <a:prstGeom prst="rect">
-            <a:avLst/>
-          </a:prstGeom>
-        </p:spPr>
-      </p:pic>
-      <p:pic>
-        <p:nvPicPr>
-          <p:cNvPr id="5" name="Picture 4"/>
-          <p:cNvPicPr>
-            <a:picLocks noChangeAspect="1"/>
-          </p:cNvPicPr>
-          <p:nvPr/>
-        </p:nvPicPr>
-        <p:blipFill>
-          <a:blip r:embed="rId4" cstate="print">
-            <a:extLst>
-              <a:ext uri="{28A0092B-C50C-407E-A947-70E740481C1C}">
-                <a14:useLocalDpi xmlns:a14="http://schemas.microsoft.com/office/drawing/2010/main" val="0"/>
-              </a:ext>
-            </a:extLst>
-          </a:blip>
-          <a:stretch>
-            <a:fillRect/>
-          </a:stretch>
-        </p:blipFill>
-        <p:spPr>
-          <a:xfrm>
-            <a:off x="2074890" y="1963646"/>
-            <a:ext cx="2999386" cy="2760595"/>
-          </a:xfrm>
-          <a:prstGeom prst="rect">
-            <a:avLst/>
-          </a:prstGeom>
-        </p:spPr>
-      </p:pic>
-      <p:pic>
-        <p:nvPicPr>
-          <p:cNvPr id="6" name="Picture 5"/>
-          <p:cNvPicPr>
-            <a:picLocks noChangeAspect="1"/>
-          </p:cNvPicPr>
-          <p:nvPr/>
-        </p:nvPicPr>
-        <p:blipFill>
-          <a:blip r:embed="rId5">
-            <a:extLst>
-              <a:ext uri="{28A0092B-C50C-407E-A947-70E740481C1C}">
-                <a14:useLocalDpi xmlns:a14="http://schemas.microsoft.com/office/drawing/2010/main" val="0"/>
-              </a:ext>
-            </a:extLst>
-          </a:blip>
-          <a:stretch>
-            <a:fillRect/>
-          </a:stretch>
-        </p:blipFill>
-        <p:spPr>
-          <a:xfrm>
-            <a:off x="4939730" y="2016371"/>
-            <a:ext cx="2655146" cy="2655146"/>
-          </a:xfrm>
-          <a:prstGeom prst="rect">
-            <a:avLst/>
-          </a:prstGeom>
-        </p:spPr>
-      </p:pic>
     </p:spTree>
     <p:extLst>
       <p:ext uri="{BB962C8B-B14F-4D97-AF65-F5344CB8AC3E}">
@@ -19764,7 +21041,7 @@
     <p:bg>
       <p:bgPr>
         <a:blipFill dpi="0" rotWithShape="1">
-          <a:blip r:embed="rId2">
+          <a:blip r:embed="rId3">
             <a:alphaModFix amt="5000"/>
             <a:lum/>
           </a:blip>
@@ -19817,7 +21094,7 @@
               <a:rPr lang="en-US" sz="4000" b="1" smtClean="0">
                 <a:latin typeface="+mn-lt"/>
               </a:rPr>
-              <a:t>CHỨC NĂNG</a:t>
+              <a:t>ƯU ĐIỂM</a:t>
             </a:r>
             <a:endParaRPr lang="en-US" sz="4000" b="1">
               <a:latin typeface="+mn-lt"/>
@@ -19833,8 +21110,8 @@
         </p:nvSpPr>
         <p:spPr>
           <a:xfrm>
-            <a:off x="748047" y="2811149"/>
-            <a:ext cx="10993459" cy="1384995"/>
+            <a:off x="1687806" y="2811149"/>
+            <a:ext cx="8636082" cy="1384995"/>
           </a:xfrm>
           <a:prstGeom prst="rect">
             <a:avLst/>
@@ -19852,8 +21129,92 @@
               <a:buChar char="-"/>
             </a:pPr>
             <a:r>
-              <a:rPr lang="en-US" sz="2800" smtClean="0"/>
-              <a:t>Tự động tìm kiếm tài xế/ chủ hàng phù hợp dựa trên các tiêu chí có sẵn</a:t>
+              <a:rPr lang="en-US" sz="2800" dirty="0" err="1" smtClean="0"/>
+              <a:t>Chủ</a:t>
+            </a:r>
+            <a:r>
+              <a:rPr lang="en-US" sz="2800" dirty="0" smtClean="0"/>
+              <a:t> </a:t>
+            </a:r>
+            <a:r>
+              <a:rPr lang="en-US" sz="2800" dirty="0" err="1" smtClean="0"/>
+              <a:t>hàng</a:t>
+            </a:r>
+            <a:r>
+              <a:rPr lang="en-US" sz="2800" dirty="0" smtClean="0"/>
+              <a:t> </a:t>
+            </a:r>
+            <a:r>
+              <a:rPr lang="en-US" sz="2800" dirty="0" err="1" smtClean="0"/>
+              <a:t>có</a:t>
+            </a:r>
+            <a:r>
+              <a:rPr lang="en-US" sz="2800" dirty="0" smtClean="0"/>
+              <a:t> </a:t>
+            </a:r>
+            <a:r>
+              <a:rPr lang="en-US" sz="2800" dirty="0" err="1" smtClean="0"/>
+              <a:t>thể</a:t>
+            </a:r>
+            <a:r>
+              <a:rPr lang="en-US" sz="2800" dirty="0" smtClean="0"/>
+              <a:t> </a:t>
+            </a:r>
+            <a:r>
+              <a:rPr lang="en-US" sz="2800" dirty="0" err="1" smtClean="0"/>
+              <a:t>tìm</a:t>
+            </a:r>
+            <a:r>
+              <a:rPr lang="en-US" sz="2800" dirty="0" smtClean="0"/>
+              <a:t> </a:t>
+            </a:r>
+            <a:r>
+              <a:rPr lang="en-US" sz="2800" dirty="0" err="1" smtClean="0"/>
+              <a:t>được</a:t>
+            </a:r>
+            <a:r>
+              <a:rPr lang="en-US" sz="2800" dirty="0" smtClean="0"/>
+              <a:t> </a:t>
+            </a:r>
+            <a:r>
+              <a:rPr lang="en-US" sz="2800" dirty="0" err="1" smtClean="0"/>
+              <a:t>xe</a:t>
+            </a:r>
+            <a:r>
+              <a:rPr lang="en-US" sz="2800" dirty="0" smtClean="0"/>
+              <a:t> </a:t>
+            </a:r>
+            <a:r>
+              <a:rPr lang="en-US" sz="2800" dirty="0" err="1" smtClean="0"/>
+              <a:t>vận</a:t>
+            </a:r>
+            <a:r>
+              <a:rPr lang="en-US" sz="2800" dirty="0" smtClean="0"/>
+              <a:t> </a:t>
+            </a:r>
+            <a:r>
+              <a:rPr lang="en-US" sz="2800" dirty="0" err="1" smtClean="0"/>
+              <a:t>chuyển</a:t>
+            </a:r>
+            <a:r>
+              <a:rPr lang="en-US" sz="2800" dirty="0" smtClean="0"/>
+              <a:t> </a:t>
+            </a:r>
+            <a:r>
+              <a:rPr lang="en-US" sz="2800" dirty="0" err="1" smtClean="0"/>
+              <a:t>nhanh</a:t>
+            </a:r>
+            <a:r>
+              <a:rPr lang="en-US" sz="2800" dirty="0" smtClean="0"/>
+              <a:t> </a:t>
+            </a:r>
+            <a:r>
+              <a:rPr lang="en-US" sz="2800" dirty="0" err="1" smtClean="0"/>
+              <a:t>chóng</a:t>
+            </a:r>
+            <a:r>
+              <a:rPr lang="en-US" sz="2800" dirty="0" smtClean="0"/>
+              <a:t> </a:t>
             </a:r>
           </a:p>
           <a:p>
@@ -19862,9 +21223,74 @@
               <a:buChar char="-"/>
             </a:pPr>
             <a:r>
-              <a:rPr lang="en-US" sz="2800" smtClean="0"/>
-              <a:t>Thực hiện thỏa thuận trực tiếp</a:t>
-            </a:r>
+              <a:rPr lang="en-US" sz="2800" dirty="0" err="1" smtClean="0"/>
+              <a:t>Đảm</a:t>
+            </a:r>
+            <a:r>
+              <a:rPr lang="en-US" sz="2800" dirty="0" smtClean="0"/>
+              <a:t> </a:t>
+            </a:r>
+            <a:r>
+              <a:rPr lang="en-US" sz="2800" dirty="0" err="1" smtClean="0"/>
+              <a:t>bảo</a:t>
+            </a:r>
+            <a:r>
+              <a:rPr lang="en-US" sz="2800" dirty="0" smtClean="0"/>
+              <a:t> </a:t>
+            </a:r>
+            <a:r>
+              <a:rPr lang="en-US" sz="2800" dirty="0" err="1" smtClean="0"/>
+              <a:t>hàng</a:t>
+            </a:r>
+            <a:r>
+              <a:rPr lang="en-US" sz="2800" dirty="0" smtClean="0"/>
+              <a:t> </a:t>
+            </a:r>
+            <a:r>
+              <a:rPr lang="en-US" sz="2800" dirty="0" err="1" smtClean="0"/>
+              <a:t>hóa</a:t>
+            </a:r>
+            <a:r>
+              <a:rPr lang="en-US" sz="2800" dirty="0" smtClean="0"/>
+              <a:t> </a:t>
+            </a:r>
+            <a:r>
+              <a:rPr lang="en-US" sz="2800" dirty="0" err="1" smtClean="0"/>
+              <a:t>được</a:t>
+            </a:r>
+            <a:r>
+              <a:rPr lang="en-US" sz="2800" dirty="0" smtClean="0"/>
+              <a:t> </a:t>
+            </a:r>
+            <a:r>
+              <a:rPr lang="en-US" sz="2800" dirty="0" err="1" smtClean="0"/>
+              <a:t>vận</a:t>
+            </a:r>
+            <a:r>
+              <a:rPr lang="en-US" sz="2800" dirty="0" smtClean="0"/>
+              <a:t> </a:t>
+            </a:r>
+            <a:r>
+              <a:rPr lang="en-US" sz="2800" dirty="0" err="1" smtClean="0"/>
+              <a:t>chuyển</a:t>
+            </a:r>
+            <a:r>
+              <a:rPr lang="en-US" sz="2800" dirty="0" smtClean="0"/>
+              <a:t> </a:t>
+            </a:r>
+            <a:r>
+              <a:rPr lang="en-US" sz="2800" dirty="0" err="1" smtClean="0"/>
+              <a:t>cẩn</a:t>
+            </a:r>
+            <a:r>
+              <a:rPr lang="en-US" sz="2800" dirty="0" smtClean="0"/>
+              <a:t> </a:t>
+            </a:r>
+            <a:r>
+              <a:rPr lang="en-US" sz="2800" dirty="0" err="1" smtClean="0"/>
+              <a:t>thận</a:t>
+            </a:r>
+            <a:endParaRPr lang="en-US" sz="2800" dirty="0" smtClean="0"/>
           </a:p>
           <a:p>
             <a:pPr marL="457200" indent="-457200">
@@ -19872,16 +21298,73 @@
               <a:buChar char="-"/>
             </a:pPr>
             <a:r>
-              <a:rPr lang="en-US" sz="2800" smtClean="0"/>
-              <a:t>Thực hiện chia trả thông qua hệ thống</a:t>
-            </a:r>
+              <a:rPr lang="en-US" sz="2800" dirty="0" err="1" smtClean="0"/>
+              <a:t>Tăng</a:t>
+            </a:r>
+            <a:r>
+              <a:rPr lang="en-US" sz="2800" dirty="0" smtClean="0"/>
+              <a:t> </a:t>
+            </a:r>
+            <a:r>
+              <a:rPr lang="en-US" sz="2800" dirty="0" err="1" smtClean="0"/>
+              <a:t>thu</a:t>
+            </a:r>
+            <a:r>
+              <a:rPr lang="en-US" sz="2800" dirty="0" smtClean="0"/>
+              <a:t> </a:t>
+            </a:r>
+            <a:r>
+              <a:rPr lang="en-US" sz="2800" dirty="0" err="1" smtClean="0"/>
+              <a:t>nhập</a:t>
+            </a:r>
+            <a:r>
+              <a:rPr lang="en-US" sz="2800" dirty="0" smtClean="0"/>
+              <a:t> </a:t>
+            </a:r>
+            <a:r>
+              <a:rPr lang="en-US" sz="2800" dirty="0" err="1" smtClean="0"/>
+              <a:t>cho</a:t>
+            </a:r>
+            <a:r>
+              <a:rPr lang="en-US" sz="2800" dirty="0" smtClean="0"/>
+              <a:t> </a:t>
+            </a:r>
+            <a:r>
+              <a:rPr lang="en-US" sz="2800" dirty="0" err="1" smtClean="0"/>
+              <a:t>tài</a:t>
+            </a:r>
+            <a:r>
+              <a:rPr lang="en-US" sz="2800" dirty="0" smtClean="0"/>
+              <a:t> </a:t>
+            </a:r>
+            <a:r>
+              <a:rPr lang="en-US" sz="2800" dirty="0" err="1" smtClean="0"/>
+              <a:t>xế</a:t>
+            </a:r>
+            <a:r>
+              <a:rPr lang="en-US" sz="2800" dirty="0" smtClean="0"/>
+              <a:t> </a:t>
+            </a:r>
+            <a:r>
+              <a:rPr lang="en-US" sz="2800" dirty="0" err="1" smtClean="0"/>
+              <a:t>xe</a:t>
+            </a:r>
+            <a:r>
+              <a:rPr lang="en-US" sz="2800" dirty="0" smtClean="0"/>
+              <a:t> </a:t>
+            </a:r>
+            <a:r>
+              <a:rPr lang="en-US" sz="2800" dirty="0" err="1" smtClean="0"/>
+              <a:t>tải</a:t>
+            </a:r>
+            <a:endParaRPr lang="en-US" sz="2800" dirty="0" smtClean="0"/>
           </a:p>
         </p:txBody>
       </p:sp>
     </p:spTree>
     <p:extLst>
       <p:ext uri="{BB962C8B-B14F-4D97-AF65-F5344CB8AC3E}">
-        <p14:creationId xmlns:p14="http://schemas.microsoft.com/office/powerpoint/2010/main" val="2727099745"/>
+        <p14:creationId xmlns:p14="http://schemas.microsoft.com/office/powerpoint/2010/main" val="3478636801"/>
       </p:ext>
     </p:extLst>
   </p:cSld>

</xml_diff>